<commit_message>
- LS XGK PLC export 작업 중.
</commit_message>
<xml_diff>
--- a/DsDotNet/src/PLC/PLCXgiXgkXmlSamples/XGK/XgkTimer.pptx
+++ b/DsDotNet/src/PLC/PLCXgiXgkXmlSamples/XGK/XgkTimer.pptx
@@ -107,6 +107,11 @@
       </a:defRPr>
     </a:lvl9pPr>
   </p:defaultTextStyle>
+  <p:extLst>
+    <p:ext uri="{EFAFB233-063F-42B5-8137-9DF3F51BA10A}">
+      <p15:sldGuideLst xmlns:p15="http://schemas.microsoft.com/office/powerpoint/2012/main"/>
+    </p:ext>
+  </p:extLst>
 </p:presentation>
 </file>
 
@@ -3645,8 +3650,8 @@
         </p:nvSpPr>
         <p:spPr>
           <a:xfrm>
-            <a:off x="720469" y="3076555"/>
-            <a:ext cx="6095276" cy="3416320"/>
+            <a:off x="720468" y="3076555"/>
+            <a:ext cx="8618545" cy="3647152"/>
           </a:xfrm>
           <a:prstGeom prst="rect">
             <a:avLst/>
@@ -3660,7 +3665,7 @@
           <a:lstStyle/>
           <a:p>
             <a:r>
-              <a:rPr lang="en-US" altLang="ko-KR" sz="1200" b="0" dirty="0">
+              <a:rPr lang="en-US" altLang="ko-KR" sz="1050" b="0" dirty="0">
                 <a:solidFill>
                   <a:srgbClr val="808080"/>
                 </a:solidFill>
@@ -3670,7 +3675,7 @@
               <a:t>&lt;</a:t>
             </a:r>
             <a:r>
-              <a:rPr lang="en-US" altLang="ko-KR" sz="1200" b="0" dirty="0" err="1">
+              <a:rPr lang="en-US" altLang="ko-KR" sz="1050" b="0" dirty="0" err="1">
                 <a:solidFill>
                   <a:srgbClr val="569CD6"/>
                 </a:solidFill>
@@ -3680,7 +3685,7 @@
               <a:t>LDRoutine</a:t>
             </a:r>
             <a:r>
-              <a:rPr lang="en-US" altLang="ko-KR" sz="1200" b="0" dirty="0">
+              <a:rPr lang="en-US" altLang="ko-KR" sz="1050" b="0" dirty="0">
                 <a:solidFill>
                   <a:srgbClr val="808080"/>
                 </a:solidFill>
@@ -3689,7 +3694,7 @@
               </a:rPr>
               <a:t>&gt;</a:t>
             </a:r>
-            <a:endParaRPr lang="en-US" altLang="ko-KR" sz="1200" b="0" dirty="0">
+            <a:endParaRPr lang="en-US" altLang="ko-KR" sz="1050" b="0" dirty="0">
               <a:solidFill>
                 <a:srgbClr val="CCCCCC"/>
               </a:solidFill>
@@ -3699,7 +3704,7 @@
           </a:p>
           <a:p>
             <a:r>
-              <a:rPr lang="en-US" altLang="ko-KR" sz="1200" b="0" dirty="0">
+              <a:rPr lang="en-US" altLang="ko-KR" sz="1050" b="0" dirty="0">
                 <a:solidFill>
                   <a:srgbClr val="CCCCCC"/>
                 </a:solidFill>
@@ -3709,7 +3714,7 @@
               <a:t>    </a:t>
             </a:r>
             <a:r>
-              <a:rPr lang="en-US" altLang="ko-KR" sz="1200" b="0" dirty="0">
+              <a:rPr lang="en-US" altLang="ko-KR" sz="1050" b="0" dirty="0">
                 <a:solidFill>
                   <a:srgbClr val="808080"/>
                 </a:solidFill>
@@ -3719,7 +3724,7 @@
               <a:t>&lt;</a:t>
             </a:r>
             <a:r>
-              <a:rPr lang="en-US" altLang="ko-KR" sz="1200" b="0" dirty="0">
+              <a:rPr lang="en-US" altLang="ko-KR" sz="1050" b="0" dirty="0">
                 <a:solidFill>
                   <a:srgbClr val="569CD6"/>
                 </a:solidFill>
@@ -3729,7 +3734,7 @@
               <a:t>Rung</a:t>
             </a:r>
             <a:r>
-              <a:rPr lang="en-US" altLang="ko-KR" sz="1200" b="0" dirty="0">
+              <a:rPr lang="en-US" altLang="ko-KR" sz="1050" b="0" dirty="0">
                 <a:solidFill>
                   <a:srgbClr val="CCCCCC"/>
                 </a:solidFill>
@@ -3739,7 +3744,7 @@
               <a:t> </a:t>
             </a:r>
             <a:r>
-              <a:rPr lang="en-US" altLang="ko-KR" sz="1200" b="0" dirty="0" err="1">
+              <a:rPr lang="en-US" altLang="ko-KR" sz="1050" b="0" dirty="0" err="1">
                 <a:solidFill>
                   <a:srgbClr val="9CDCFE"/>
                 </a:solidFill>
@@ -3749,7 +3754,7 @@
               <a:t>BlockMask</a:t>
             </a:r>
             <a:r>
-              <a:rPr lang="en-US" altLang="ko-KR" sz="1200" b="0" dirty="0">
+              <a:rPr lang="en-US" altLang="ko-KR" sz="1050" b="0" dirty="0">
                 <a:solidFill>
                   <a:srgbClr val="CCCCCC"/>
                 </a:solidFill>
@@ -3759,7 +3764,7 @@
               <a:t>=</a:t>
             </a:r>
             <a:r>
-              <a:rPr lang="en-US" altLang="ko-KR" sz="1200" b="0" dirty="0">
+              <a:rPr lang="en-US" altLang="ko-KR" sz="1050" b="0" dirty="0">
                 <a:solidFill>
                   <a:srgbClr val="CE9178"/>
                 </a:solidFill>
@@ -3769,7 +3774,7 @@
               <a:t>"0"</a:t>
             </a:r>
             <a:r>
-              <a:rPr lang="en-US" altLang="ko-KR" sz="1200" b="0" dirty="0">
+              <a:rPr lang="en-US" altLang="ko-KR" sz="1050" b="0" dirty="0">
                 <a:solidFill>
                   <a:srgbClr val="808080"/>
                 </a:solidFill>
@@ -3778,7 +3783,7 @@
               </a:rPr>
               <a:t>&gt;</a:t>
             </a:r>
-            <a:endParaRPr lang="en-US" altLang="ko-KR" sz="1200" b="0" dirty="0">
+            <a:endParaRPr lang="en-US" altLang="ko-KR" sz="1050" b="0" dirty="0">
               <a:solidFill>
                 <a:srgbClr val="CCCCCC"/>
               </a:solidFill>
@@ -3788,7 +3793,7 @@
           </a:p>
           <a:p>
             <a:r>
-              <a:rPr lang="en-US" altLang="ko-KR" sz="1200" b="0" dirty="0">
+              <a:rPr lang="en-US" altLang="ko-KR" sz="1050" b="0" dirty="0">
                 <a:solidFill>
                   <a:srgbClr val="CCCCCC"/>
                 </a:solidFill>
@@ -3798,7 +3803,7 @@
               <a:t>        </a:t>
             </a:r>
             <a:r>
-              <a:rPr lang="en-US" altLang="ko-KR" sz="1200" b="0" dirty="0">
+              <a:rPr lang="en-US" altLang="ko-KR" sz="1050" b="0" dirty="0">
                 <a:solidFill>
                   <a:srgbClr val="808080"/>
                 </a:solidFill>
@@ -3808,7 +3813,7 @@
               <a:t>&lt;</a:t>
             </a:r>
             <a:r>
-              <a:rPr lang="en-US" altLang="ko-KR" sz="1200" b="0" dirty="0">
+              <a:rPr lang="en-US" altLang="ko-KR" sz="1050" b="0" dirty="0">
                 <a:solidFill>
                   <a:srgbClr val="569CD6"/>
                 </a:solidFill>
@@ -3818,7 +3823,7 @@
               <a:t>Element</a:t>
             </a:r>
             <a:r>
-              <a:rPr lang="en-US" altLang="ko-KR" sz="1200" b="0" dirty="0">
+              <a:rPr lang="en-US" altLang="ko-KR" sz="1050" b="0" dirty="0">
                 <a:solidFill>
                   <a:srgbClr val="CCCCCC"/>
                 </a:solidFill>
@@ -3828,7 +3833,7 @@
               <a:t> </a:t>
             </a:r>
             <a:r>
-              <a:rPr lang="en-US" altLang="ko-KR" sz="1200" b="0" dirty="0" err="1">
+              <a:rPr lang="en-US" altLang="ko-KR" sz="1050" b="0" dirty="0" err="1">
                 <a:solidFill>
                   <a:srgbClr val="9CDCFE"/>
                 </a:solidFill>
@@ -3838,7 +3843,7 @@
               <a:t>ElementType</a:t>
             </a:r>
             <a:r>
-              <a:rPr lang="en-US" altLang="ko-KR" sz="1200" b="0" dirty="0">
+              <a:rPr lang="en-US" altLang="ko-KR" sz="1050" b="0" dirty="0">
                 <a:solidFill>
                   <a:srgbClr val="CCCCCC"/>
                 </a:solidFill>
@@ -3848,7 +3853,7 @@
               <a:t>=</a:t>
             </a:r>
             <a:r>
-              <a:rPr lang="en-US" altLang="ko-KR" sz="1200" b="0" dirty="0">
+              <a:rPr lang="en-US" altLang="ko-KR" sz="1050" b="0" dirty="0">
                 <a:solidFill>
                   <a:srgbClr val="CE9178"/>
                 </a:solidFill>
@@ -3858,7 +3863,7 @@
               <a:t>"6"</a:t>
             </a:r>
             <a:r>
-              <a:rPr lang="en-US" altLang="ko-KR" sz="1200" b="0" dirty="0">
+              <a:rPr lang="en-US" altLang="ko-KR" sz="1050" b="0" dirty="0">
                 <a:solidFill>
                   <a:srgbClr val="CCCCCC"/>
                 </a:solidFill>
@@ -3868,7 +3873,7 @@
               <a:t> </a:t>
             </a:r>
             <a:r>
-              <a:rPr lang="en-US" altLang="ko-KR" sz="1200" b="0" dirty="0">
+              <a:rPr lang="en-US" altLang="ko-KR" sz="1050" b="0" dirty="0">
                 <a:solidFill>
                   <a:srgbClr val="9CDCFE"/>
                 </a:solidFill>
@@ -3878,7 +3883,7 @@
               <a:t>Coordinate</a:t>
             </a:r>
             <a:r>
-              <a:rPr lang="en-US" altLang="ko-KR" sz="1200" b="0" dirty="0">
+              <a:rPr lang="en-US" altLang="ko-KR" sz="1050" b="0" dirty="0">
                 <a:solidFill>
                   <a:srgbClr val="CCCCCC"/>
                 </a:solidFill>
@@ -3888,7 +3893,7 @@
               <a:t>=</a:t>
             </a:r>
             <a:r>
-              <a:rPr lang="en-US" altLang="ko-KR" sz="1200" b="0" dirty="0">
+              <a:rPr lang="en-US" altLang="ko-KR" sz="1050" b="0" dirty="0">
                 <a:solidFill>
                   <a:srgbClr val="CE9178"/>
                 </a:solidFill>
@@ -3898,7 +3903,7 @@
               <a:t>"1"</a:t>
             </a:r>
             <a:r>
-              <a:rPr lang="en-US" altLang="ko-KR" sz="1200" b="0" dirty="0">
+              <a:rPr lang="en-US" altLang="ko-KR" sz="1050" b="0" dirty="0">
                 <a:solidFill>
                   <a:srgbClr val="808080"/>
                 </a:solidFill>
@@ -3908,7 +3913,7 @@
               <a:t>&gt;</a:t>
             </a:r>
             <a:r>
-              <a:rPr lang="en-US" altLang="ko-KR" sz="1200" b="0" dirty="0">
+              <a:rPr lang="en-US" altLang="ko-KR" sz="1050" b="0" dirty="0">
                 <a:solidFill>
                   <a:srgbClr val="CCCCCC"/>
                 </a:solidFill>
@@ -3918,7 +3923,7 @@
               <a:t>M00000</a:t>
             </a:r>
             <a:r>
-              <a:rPr lang="en-US" altLang="ko-KR" sz="1200" b="0" dirty="0">
+              <a:rPr lang="en-US" altLang="ko-KR" sz="1050" b="0" dirty="0">
                 <a:solidFill>
                   <a:srgbClr val="808080"/>
                 </a:solidFill>
@@ -3928,7 +3933,7 @@
               <a:t>&lt;/</a:t>
             </a:r>
             <a:r>
-              <a:rPr lang="en-US" altLang="ko-KR" sz="1200" b="0" dirty="0">
+              <a:rPr lang="en-US" altLang="ko-KR" sz="1050" b="0" dirty="0">
                 <a:solidFill>
                   <a:srgbClr val="569CD6"/>
                 </a:solidFill>
@@ -3938,7 +3943,7 @@
               <a:t>Element</a:t>
             </a:r>
             <a:r>
-              <a:rPr lang="en-US" altLang="ko-KR" sz="1200" b="0" dirty="0">
+              <a:rPr lang="en-US" altLang="ko-KR" sz="1050" b="0" dirty="0">
                 <a:solidFill>
                   <a:srgbClr val="808080"/>
                 </a:solidFill>
@@ -3947,7 +3952,7 @@
               </a:rPr>
               <a:t>&gt;</a:t>
             </a:r>
-            <a:endParaRPr lang="en-US" altLang="ko-KR" sz="1200" b="0" dirty="0">
+            <a:endParaRPr lang="en-US" altLang="ko-KR" sz="1050" b="0" dirty="0">
               <a:solidFill>
                 <a:srgbClr val="CCCCCC"/>
               </a:solidFill>
@@ -3957,7 +3962,7 @@
           </a:p>
           <a:p>
             <a:r>
-              <a:rPr lang="en-US" altLang="ko-KR" sz="1200" b="0" dirty="0">
+              <a:rPr lang="en-US" altLang="ko-KR" sz="1050" b="0" dirty="0">
                 <a:solidFill>
                   <a:srgbClr val="CCCCCC"/>
                 </a:solidFill>
@@ -3967,7 +3972,7 @@
               <a:t>        </a:t>
             </a:r>
             <a:r>
-              <a:rPr lang="en-US" altLang="ko-KR" sz="1200" b="0" dirty="0">
+              <a:rPr lang="en-US" altLang="ko-KR" sz="1050" b="0" dirty="0">
                 <a:solidFill>
                   <a:srgbClr val="808080"/>
                 </a:solidFill>
@@ -3977,7 +3982,7 @@
               <a:t>&lt;</a:t>
             </a:r>
             <a:r>
-              <a:rPr lang="en-US" altLang="ko-KR" sz="1200" b="0" dirty="0">
+              <a:rPr lang="en-US" altLang="ko-KR" sz="1050" b="0" dirty="0">
                 <a:solidFill>
                   <a:srgbClr val="569CD6"/>
                 </a:solidFill>
@@ -3987,7 +3992,7 @@
               <a:t>Element</a:t>
             </a:r>
             <a:r>
-              <a:rPr lang="en-US" altLang="ko-KR" sz="1200" b="0" dirty="0">
+              <a:rPr lang="en-US" altLang="ko-KR" sz="1050" b="0" dirty="0">
                 <a:solidFill>
                   <a:srgbClr val="CCCCCC"/>
                 </a:solidFill>
@@ -3997,7 +4002,7 @@
               <a:t> </a:t>
             </a:r>
             <a:r>
-              <a:rPr lang="en-US" altLang="ko-KR" sz="1200" b="0" dirty="0" err="1">
+              <a:rPr lang="en-US" altLang="ko-KR" sz="1050" b="0" dirty="0" err="1">
                 <a:solidFill>
                   <a:srgbClr val="9CDCFE"/>
                 </a:solidFill>
@@ -4007,7 +4012,7 @@
               <a:t>ElementType</a:t>
             </a:r>
             <a:r>
-              <a:rPr lang="en-US" altLang="ko-KR" sz="1200" b="0" dirty="0">
+              <a:rPr lang="en-US" altLang="ko-KR" sz="1050" b="0" dirty="0">
                 <a:solidFill>
                   <a:srgbClr val="CCCCCC"/>
                 </a:solidFill>
@@ -4017,7 +4022,7 @@
               <a:t>=</a:t>
             </a:r>
             <a:r>
-              <a:rPr lang="en-US" altLang="ko-KR" sz="1200" b="0" dirty="0">
+              <a:rPr lang="en-US" altLang="ko-KR" sz="1050" b="0" dirty="0">
                 <a:solidFill>
                   <a:srgbClr val="CE9178"/>
                 </a:solidFill>
@@ -4027,7 +4032,7 @@
               <a:t>"2"</a:t>
             </a:r>
             <a:r>
-              <a:rPr lang="en-US" altLang="ko-KR" sz="1200" b="0" dirty="0">
+              <a:rPr lang="en-US" altLang="ko-KR" sz="1050" b="0" dirty="0">
                 <a:solidFill>
                   <a:srgbClr val="CCCCCC"/>
                 </a:solidFill>
@@ -4037,7 +4042,7 @@
               <a:t> </a:t>
             </a:r>
             <a:r>
-              <a:rPr lang="en-US" altLang="ko-KR" sz="1200" b="0" dirty="0">
+              <a:rPr lang="en-US" altLang="ko-KR" sz="1050" b="0" dirty="0">
                 <a:solidFill>
                   <a:srgbClr val="9CDCFE"/>
                 </a:solidFill>
@@ -4047,7 +4052,7 @@
               <a:t>Coordinate</a:t>
             </a:r>
             <a:r>
-              <a:rPr lang="en-US" altLang="ko-KR" sz="1200" b="0" dirty="0">
+              <a:rPr lang="en-US" altLang="ko-KR" sz="1050" b="0" dirty="0">
                 <a:solidFill>
                   <a:srgbClr val="CCCCCC"/>
                 </a:solidFill>
@@ -4057,7 +4062,7 @@
               <a:t>=</a:t>
             </a:r>
             <a:r>
-              <a:rPr lang="en-US" altLang="ko-KR" sz="1200" b="0" dirty="0">
+              <a:rPr lang="en-US" altLang="ko-KR" sz="1050" b="0" dirty="0">
                 <a:solidFill>
                   <a:srgbClr val="CE9178"/>
                 </a:solidFill>
@@ -4067,7 +4072,7 @@
               <a:t>"4"</a:t>
             </a:r>
             <a:r>
-              <a:rPr lang="en-US" altLang="ko-KR" sz="1200" b="0" dirty="0">
+              <a:rPr lang="en-US" altLang="ko-KR" sz="1050" b="0" dirty="0">
                 <a:solidFill>
                   <a:srgbClr val="CCCCCC"/>
                 </a:solidFill>
@@ -4077,7 +4082,7 @@
               <a:t> </a:t>
             </a:r>
             <a:r>
-              <a:rPr lang="en-US" altLang="ko-KR" sz="1200" b="0" dirty="0">
+              <a:rPr lang="en-US" altLang="ko-KR" sz="1050" b="0" dirty="0">
                 <a:solidFill>
                   <a:srgbClr val="9CDCFE"/>
                 </a:solidFill>
@@ -4087,7 +4092,7 @@
               <a:t>Param</a:t>
             </a:r>
             <a:r>
-              <a:rPr lang="en-US" altLang="ko-KR" sz="1200" b="0" dirty="0">
+              <a:rPr lang="en-US" altLang="ko-KR" sz="1050" b="0" dirty="0">
                 <a:solidFill>
                   <a:srgbClr val="CCCCCC"/>
                 </a:solidFill>
@@ -4097,7 +4102,7 @@
               <a:t>=</a:t>
             </a:r>
             <a:r>
-              <a:rPr lang="en-US" altLang="ko-KR" sz="1200" b="0" dirty="0">
+              <a:rPr lang="en-US" altLang="ko-KR" sz="1050" b="0" dirty="0">
                 <a:solidFill>
                   <a:srgbClr val="CE9178"/>
                 </a:solidFill>
@@ -4107,7 +4112,7 @@
               <a:t>"81"</a:t>
             </a:r>
             <a:r>
-              <a:rPr lang="en-US" altLang="ko-KR" sz="1200" b="0" dirty="0">
+              <a:rPr lang="en-US" altLang="ko-KR" sz="1050" b="0" dirty="0">
                 <a:solidFill>
                   <a:srgbClr val="808080"/>
                 </a:solidFill>
@@ -4117,7 +4122,7 @@
               <a:t>&gt;&lt;/</a:t>
             </a:r>
             <a:r>
-              <a:rPr lang="en-US" altLang="ko-KR" sz="1200" b="0" dirty="0">
+              <a:rPr lang="en-US" altLang="ko-KR" sz="1050" b="0" dirty="0">
                 <a:solidFill>
                   <a:srgbClr val="569CD6"/>
                 </a:solidFill>
@@ -4127,7 +4132,7 @@
               <a:t>Element</a:t>
             </a:r>
             <a:r>
-              <a:rPr lang="en-US" altLang="ko-KR" sz="1200" b="0" dirty="0">
+              <a:rPr lang="en-US" altLang="ko-KR" sz="1050" b="0" dirty="0">
                 <a:solidFill>
                   <a:srgbClr val="808080"/>
                 </a:solidFill>
@@ -4136,7 +4141,7 @@
               </a:rPr>
               <a:t>&gt;</a:t>
             </a:r>
-            <a:endParaRPr lang="en-US" altLang="ko-KR" sz="1200" b="0" dirty="0">
+            <a:endParaRPr lang="en-US" altLang="ko-KR" sz="1050" b="0" dirty="0">
               <a:solidFill>
                 <a:srgbClr val="CCCCCC"/>
               </a:solidFill>
@@ -4146,7 +4151,7 @@
           </a:p>
           <a:p>
             <a:r>
-              <a:rPr lang="en-US" altLang="ko-KR" sz="1200" b="0" dirty="0">
+              <a:rPr lang="en-US" altLang="ko-KR" sz="1050" b="0" dirty="0">
                 <a:solidFill>
                   <a:srgbClr val="CCCCCC"/>
                 </a:solidFill>
@@ -4156,7 +4161,7 @@
               <a:t>        </a:t>
             </a:r>
             <a:r>
-              <a:rPr lang="en-US" altLang="ko-KR" sz="1200" b="0" dirty="0">
+              <a:rPr lang="en-US" altLang="ko-KR" sz="1050" b="0" dirty="0">
                 <a:solidFill>
                   <a:srgbClr val="808080"/>
                 </a:solidFill>
@@ -4166,7 +4171,7 @@
               <a:t>&lt;</a:t>
             </a:r>
             <a:r>
-              <a:rPr lang="en-US" altLang="ko-KR" sz="1200" b="0" dirty="0">
+              <a:rPr lang="en-US" altLang="ko-KR" sz="1050" b="0" dirty="0">
                 <a:solidFill>
                   <a:srgbClr val="569CD6"/>
                 </a:solidFill>
@@ -4176,7 +4181,7 @@
               <a:t>Element</a:t>
             </a:r>
             <a:r>
-              <a:rPr lang="en-US" altLang="ko-KR" sz="1200" b="0" dirty="0">
+              <a:rPr lang="en-US" altLang="ko-KR" sz="1050" b="0" dirty="0">
                 <a:solidFill>
                   <a:srgbClr val="CCCCCC"/>
                 </a:solidFill>
@@ -4186,7 +4191,7 @@
               <a:t> </a:t>
             </a:r>
             <a:r>
-              <a:rPr lang="en-US" altLang="ko-KR" sz="1200" b="0" dirty="0" err="1">
+              <a:rPr lang="en-US" altLang="ko-KR" sz="1050" b="0" dirty="0" err="1">
                 <a:solidFill>
                   <a:srgbClr val="9CDCFE"/>
                 </a:solidFill>
@@ -4196,7 +4201,7 @@
               <a:t>ElementType</a:t>
             </a:r>
             <a:r>
-              <a:rPr lang="en-US" altLang="ko-KR" sz="1200" b="1" dirty="0">
+              <a:rPr lang="en-US" altLang="ko-KR" sz="1050" b="1" dirty="0">
                 <a:solidFill>
                   <a:srgbClr val="FF0000"/>
                 </a:solidFill>
@@ -4206,7 +4211,7 @@
               <a:t>="33" </a:t>
             </a:r>
             <a:r>
-              <a:rPr lang="en-US" altLang="ko-KR" sz="1200" b="0" dirty="0">
+              <a:rPr lang="en-US" altLang="ko-KR" sz="1050" b="0" dirty="0">
                 <a:solidFill>
                   <a:srgbClr val="9CDCFE"/>
                 </a:solidFill>
@@ -4216,7 +4221,7 @@
               <a:t>Coordinate</a:t>
             </a:r>
             <a:r>
-              <a:rPr lang="en-US" altLang="ko-KR" sz="1200" b="0" dirty="0">
+              <a:rPr lang="en-US" altLang="ko-KR" sz="1050" b="0" dirty="0">
                 <a:solidFill>
                   <a:srgbClr val="CCCCCC"/>
                 </a:solidFill>
@@ -4226,7 +4231,7 @@
               <a:t>=</a:t>
             </a:r>
             <a:r>
-              <a:rPr lang="en-US" altLang="ko-KR" sz="1200" b="0" dirty="0">
+              <a:rPr lang="en-US" altLang="ko-KR" sz="1050" b="0" dirty="0">
                 <a:solidFill>
                   <a:srgbClr val="CE9178"/>
                 </a:solidFill>
@@ -4236,7 +4241,7 @@
               <a:t>"88"</a:t>
             </a:r>
             <a:r>
-              <a:rPr lang="en-US" altLang="ko-KR" sz="1200" b="0" dirty="0">
+              <a:rPr lang="en-US" altLang="ko-KR" sz="1050" b="0" dirty="0">
                 <a:solidFill>
                   <a:srgbClr val="CCCCCC"/>
                 </a:solidFill>
@@ -4246,7 +4251,7 @@
               <a:t> </a:t>
             </a:r>
             <a:r>
-              <a:rPr lang="en-US" altLang="ko-KR" sz="1200" b="0" dirty="0">
+              <a:rPr lang="en-US" altLang="ko-KR" sz="1050" b="0" dirty="0">
                 <a:solidFill>
                   <a:srgbClr val="9CDCFE"/>
                 </a:solidFill>
@@ -4256,7 +4261,7 @@
               <a:t>Param</a:t>
             </a:r>
             <a:r>
-              <a:rPr lang="en-US" altLang="ko-KR" sz="1200" b="0" dirty="0">
+              <a:rPr lang="en-US" altLang="ko-KR" sz="1050" b="0" dirty="0">
                 <a:solidFill>
                   <a:srgbClr val="CCCCCC"/>
                 </a:solidFill>
@@ -4266,7 +4271,7 @@
               <a:t>=</a:t>
             </a:r>
             <a:r>
-              <a:rPr lang="en-US" altLang="ko-KR" sz="1200" b="1" dirty="0">
+              <a:rPr lang="en-US" altLang="ko-KR" sz="1050" b="1" dirty="0">
                 <a:solidFill>
                   <a:srgbClr val="FF0000"/>
                 </a:solidFill>
@@ -4276,7 +4281,7 @@
               <a:t>"TON,T0000,20"</a:t>
             </a:r>
             <a:r>
-              <a:rPr lang="en-US" altLang="ko-KR" sz="1200" b="0" dirty="0">
+              <a:rPr lang="en-US" altLang="ko-KR" sz="1050" b="0" dirty="0">
                 <a:solidFill>
                   <a:srgbClr val="808080"/>
                 </a:solidFill>
@@ -4285,7 +4290,7 @@
               </a:rPr>
               <a:t>&gt;</a:t>
             </a:r>
-            <a:endParaRPr lang="en-US" altLang="ko-KR" sz="1200" b="0" dirty="0">
+            <a:endParaRPr lang="en-US" altLang="ko-KR" sz="1050" b="0" dirty="0">
               <a:solidFill>
                 <a:srgbClr val="CCCCCC"/>
               </a:solidFill>
@@ -4295,7 +4300,7 @@
           </a:p>
           <a:p>
             <a:r>
-              <a:rPr lang="en-US" altLang="ko-KR" sz="1200" b="0" dirty="0">
+              <a:rPr lang="en-US" altLang="ko-KR" sz="1050" b="0" dirty="0">
                 <a:solidFill>
                   <a:srgbClr val="CCCCCC"/>
                 </a:solidFill>
@@ -4305,7 +4310,7 @@
               <a:t>TON</a:t>
             </a:r>
             <a:r>
-              <a:rPr lang="en-US" altLang="ko-KR" sz="1200" b="0" dirty="0">
+              <a:rPr lang="en-US" altLang="ko-KR" sz="1050" b="0" dirty="0">
                 <a:solidFill>
                   <a:srgbClr val="808080"/>
                 </a:solidFill>
@@ -4315,7 +4320,7 @@
               <a:t>&lt;/</a:t>
             </a:r>
             <a:r>
-              <a:rPr lang="en-US" altLang="ko-KR" sz="1200" b="0" dirty="0">
+              <a:rPr lang="en-US" altLang="ko-KR" sz="1050" b="0" dirty="0">
                 <a:solidFill>
                   <a:srgbClr val="569CD6"/>
                 </a:solidFill>
@@ -4325,7 +4330,7 @@
               <a:t>Element</a:t>
             </a:r>
             <a:r>
-              <a:rPr lang="en-US" altLang="ko-KR" sz="1200" b="0" dirty="0">
+              <a:rPr lang="en-US" altLang="ko-KR" sz="1050" b="0" dirty="0">
                 <a:solidFill>
                   <a:srgbClr val="808080"/>
                 </a:solidFill>
@@ -4334,7 +4339,7 @@
               </a:rPr>
               <a:t>&gt;</a:t>
             </a:r>
-            <a:endParaRPr lang="en-US" altLang="ko-KR" sz="1200" b="0" dirty="0">
+            <a:endParaRPr lang="en-US" altLang="ko-KR" sz="1050" b="0" dirty="0">
               <a:solidFill>
                 <a:srgbClr val="CCCCCC"/>
               </a:solidFill>
@@ -4344,7 +4349,7 @@
           </a:p>
           <a:p>
             <a:r>
-              <a:rPr lang="en-US" altLang="ko-KR" sz="1200" b="0" dirty="0">
+              <a:rPr lang="en-US" altLang="ko-KR" sz="1050" b="0" dirty="0">
                 <a:solidFill>
                   <a:srgbClr val="CCCCCC"/>
                 </a:solidFill>
@@ -4354,7 +4359,7 @@
               <a:t>    </a:t>
             </a:r>
             <a:r>
-              <a:rPr lang="en-US" altLang="ko-KR" sz="1200" b="0" dirty="0">
+              <a:rPr lang="en-US" altLang="ko-KR" sz="1050" b="0" dirty="0">
                 <a:solidFill>
                   <a:srgbClr val="808080"/>
                 </a:solidFill>
@@ -4364,7 +4369,7 @@
               <a:t>&lt;/</a:t>
             </a:r>
             <a:r>
-              <a:rPr lang="en-US" altLang="ko-KR" sz="1200" b="0" dirty="0">
+              <a:rPr lang="en-US" altLang="ko-KR" sz="1050" b="0" dirty="0">
                 <a:solidFill>
                   <a:srgbClr val="569CD6"/>
                 </a:solidFill>
@@ -4374,7 +4379,7 @@
               <a:t>Rung</a:t>
             </a:r>
             <a:r>
-              <a:rPr lang="en-US" altLang="ko-KR" sz="1200" b="0" dirty="0">
+              <a:rPr lang="en-US" altLang="ko-KR" sz="1050" b="0" dirty="0">
                 <a:solidFill>
                   <a:srgbClr val="808080"/>
                 </a:solidFill>
@@ -4383,7 +4388,7 @@
               </a:rPr>
               <a:t>&gt;</a:t>
             </a:r>
-            <a:endParaRPr lang="en-US" altLang="ko-KR" sz="1200" b="0" dirty="0">
+            <a:endParaRPr lang="en-US" altLang="ko-KR" sz="1050" b="0" dirty="0">
               <a:solidFill>
                 <a:srgbClr val="CCCCCC"/>
               </a:solidFill>
@@ -4393,7 +4398,7 @@
           </a:p>
           <a:p>
             <a:r>
-              <a:rPr lang="en-US" altLang="ko-KR" sz="1200" b="0" dirty="0">
+              <a:rPr lang="en-US" altLang="ko-KR" sz="1050" b="0" dirty="0">
                 <a:solidFill>
                   <a:srgbClr val="CCCCCC"/>
                 </a:solidFill>
@@ -4403,7 +4408,7 @@
               <a:t>    </a:t>
             </a:r>
             <a:r>
-              <a:rPr lang="en-US" altLang="ko-KR" sz="1200" b="0" dirty="0">
+              <a:rPr lang="en-US" altLang="ko-KR" sz="1050" b="0" dirty="0">
                 <a:solidFill>
                   <a:srgbClr val="808080"/>
                 </a:solidFill>
@@ -4413,7 +4418,7 @@
               <a:t>&lt;</a:t>
             </a:r>
             <a:r>
-              <a:rPr lang="en-US" altLang="ko-KR" sz="1200" b="0" dirty="0">
+              <a:rPr lang="en-US" altLang="ko-KR" sz="1050" b="0" dirty="0">
                 <a:solidFill>
                   <a:srgbClr val="569CD6"/>
                 </a:solidFill>
@@ -4423,7 +4428,7 @@
               <a:t>Rung</a:t>
             </a:r>
             <a:r>
-              <a:rPr lang="en-US" altLang="ko-KR" sz="1200" b="0" dirty="0">
+              <a:rPr lang="en-US" altLang="ko-KR" sz="1050" b="0" dirty="0">
                 <a:solidFill>
                   <a:srgbClr val="CCCCCC"/>
                 </a:solidFill>
@@ -4433,7 +4438,7 @@
               <a:t> </a:t>
             </a:r>
             <a:r>
-              <a:rPr lang="en-US" altLang="ko-KR" sz="1200" b="0" dirty="0" err="1">
+              <a:rPr lang="en-US" altLang="ko-KR" sz="1050" b="0" dirty="0" err="1">
                 <a:solidFill>
                   <a:srgbClr val="9CDCFE"/>
                 </a:solidFill>
@@ -4443,7 +4448,7 @@
               <a:t>BlockMask</a:t>
             </a:r>
             <a:r>
-              <a:rPr lang="en-US" altLang="ko-KR" sz="1200" b="0" dirty="0">
+              <a:rPr lang="en-US" altLang="ko-KR" sz="1050" b="0" dirty="0">
                 <a:solidFill>
                   <a:srgbClr val="CCCCCC"/>
                 </a:solidFill>
@@ -4453,7 +4458,7 @@
               <a:t>=</a:t>
             </a:r>
             <a:r>
-              <a:rPr lang="en-US" altLang="ko-KR" sz="1200" b="0" dirty="0">
+              <a:rPr lang="en-US" altLang="ko-KR" sz="1050" b="0" dirty="0">
                 <a:solidFill>
                   <a:srgbClr val="CE9178"/>
                 </a:solidFill>
@@ -4463,7 +4468,7 @@
               <a:t>"0"</a:t>
             </a:r>
             <a:r>
-              <a:rPr lang="en-US" altLang="ko-KR" sz="1200" b="0" dirty="0">
+              <a:rPr lang="en-US" altLang="ko-KR" sz="1050" b="0" dirty="0">
                 <a:solidFill>
                   <a:srgbClr val="808080"/>
                 </a:solidFill>
@@ -4472,7 +4477,7 @@
               </a:rPr>
               <a:t>&gt;</a:t>
             </a:r>
-            <a:endParaRPr lang="en-US" altLang="ko-KR" sz="1200" b="0" dirty="0">
+            <a:endParaRPr lang="en-US" altLang="ko-KR" sz="1050" b="0" dirty="0">
               <a:solidFill>
                 <a:srgbClr val="CCCCCC"/>
               </a:solidFill>
@@ -4482,7 +4487,7 @@
           </a:p>
           <a:p>
             <a:r>
-              <a:rPr lang="en-US" altLang="ko-KR" sz="1200" b="0" dirty="0">
+              <a:rPr lang="en-US" altLang="ko-KR" sz="1050" b="0" dirty="0">
                 <a:solidFill>
                   <a:srgbClr val="CCCCCC"/>
                 </a:solidFill>
@@ -4492,7 +4497,7 @@
               <a:t>        </a:t>
             </a:r>
             <a:r>
-              <a:rPr lang="en-US" altLang="ko-KR" sz="1200" b="0" dirty="0">
+              <a:rPr lang="en-US" altLang="ko-KR" sz="1050" b="0" dirty="0">
                 <a:solidFill>
                   <a:srgbClr val="808080"/>
                 </a:solidFill>
@@ -4502,7 +4507,7 @@
               <a:t>&lt;</a:t>
             </a:r>
             <a:r>
-              <a:rPr lang="en-US" altLang="ko-KR" sz="1200" b="0" dirty="0">
+              <a:rPr lang="en-US" altLang="ko-KR" sz="1050" b="0" dirty="0">
                 <a:solidFill>
                   <a:srgbClr val="569CD6"/>
                 </a:solidFill>
@@ -4512,7 +4517,7 @@
               <a:t>Element</a:t>
             </a:r>
             <a:r>
-              <a:rPr lang="en-US" altLang="ko-KR" sz="1200" b="0" dirty="0">
+              <a:rPr lang="en-US" altLang="ko-KR" sz="1050" b="0" dirty="0">
                 <a:solidFill>
                   <a:srgbClr val="CCCCCC"/>
                 </a:solidFill>
@@ -4522,7 +4527,7 @@
               <a:t> </a:t>
             </a:r>
             <a:r>
-              <a:rPr lang="en-US" altLang="ko-KR" sz="1200" b="0" dirty="0" err="1">
+              <a:rPr lang="en-US" altLang="ko-KR" sz="1050" b="0" dirty="0" err="1">
                 <a:solidFill>
                   <a:srgbClr val="9CDCFE"/>
                 </a:solidFill>
@@ -4532,7 +4537,7 @@
               <a:t>ElementType</a:t>
             </a:r>
             <a:r>
-              <a:rPr lang="en-US" altLang="ko-KR" sz="1200" b="0" dirty="0">
+              <a:rPr lang="en-US" altLang="ko-KR" sz="1050" b="0" dirty="0">
                 <a:solidFill>
                   <a:srgbClr val="CCCCCC"/>
                 </a:solidFill>
@@ -4542,7 +4547,7 @@
               <a:t>=</a:t>
             </a:r>
             <a:r>
-              <a:rPr lang="en-US" altLang="ko-KR" sz="1200" b="0" dirty="0">
+              <a:rPr lang="en-US" altLang="ko-KR" sz="1050" b="0" dirty="0">
                 <a:solidFill>
                   <a:srgbClr val="CE9178"/>
                 </a:solidFill>
@@ -4552,7 +4557,7 @@
               <a:t>"6"</a:t>
             </a:r>
             <a:r>
-              <a:rPr lang="en-US" altLang="ko-KR" sz="1200" b="0" dirty="0">
+              <a:rPr lang="en-US" altLang="ko-KR" sz="1050" b="0" dirty="0">
                 <a:solidFill>
                   <a:srgbClr val="CCCCCC"/>
                 </a:solidFill>
@@ -4562,7 +4567,7 @@
               <a:t> </a:t>
             </a:r>
             <a:r>
-              <a:rPr lang="en-US" altLang="ko-KR" sz="1200" b="0" dirty="0">
+              <a:rPr lang="en-US" altLang="ko-KR" sz="1050" b="0" dirty="0">
                 <a:solidFill>
                   <a:srgbClr val="9CDCFE"/>
                 </a:solidFill>
@@ -4572,7 +4577,7 @@
               <a:t>Coordinate</a:t>
             </a:r>
             <a:r>
-              <a:rPr lang="en-US" altLang="ko-KR" sz="1200" b="0" dirty="0">
+              <a:rPr lang="en-US" altLang="ko-KR" sz="1050" b="0" dirty="0">
                 <a:solidFill>
                   <a:srgbClr val="CCCCCC"/>
                 </a:solidFill>
@@ -4582,7 +4587,7 @@
               <a:t>=</a:t>
             </a:r>
             <a:r>
-              <a:rPr lang="en-US" altLang="ko-KR" sz="1200" b="0" dirty="0">
+              <a:rPr lang="en-US" altLang="ko-KR" sz="1050" b="0" dirty="0">
                 <a:solidFill>
                   <a:srgbClr val="CE9178"/>
                 </a:solidFill>
@@ -4592,7 +4597,7 @@
               <a:t>"1025"</a:t>
             </a:r>
             <a:r>
-              <a:rPr lang="en-US" altLang="ko-KR" sz="1200" b="0" dirty="0">
+              <a:rPr lang="en-US" altLang="ko-KR" sz="1050" b="0" dirty="0">
                 <a:solidFill>
                   <a:srgbClr val="808080"/>
                 </a:solidFill>
@@ -4602,7 +4607,7 @@
               <a:t>&gt;</a:t>
             </a:r>
             <a:r>
-              <a:rPr lang="en-US" altLang="ko-KR" sz="1200" b="0" dirty="0">
+              <a:rPr lang="en-US" altLang="ko-KR" sz="1050" b="0" dirty="0">
                 <a:solidFill>
                   <a:srgbClr val="CCCCCC"/>
                 </a:solidFill>
@@ -4612,7 +4617,7 @@
               <a:t>T0000</a:t>
             </a:r>
             <a:r>
-              <a:rPr lang="en-US" altLang="ko-KR" sz="1200" b="0" dirty="0">
+              <a:rPr lang="en-US" altLang="ko-KR" sz="1050" b="0" dirty="0">
                 <a:solidFill>
                   <a:srgbClr val="808080"/>
                 </a:solidFill>
@@ -4622,7 +4627,7 @@
               <a:t>&lt;/</a:t>
             </a:r>
             <a:r>
-              <a:rPr lang="en-US" altLang="ko-KR" sz="1200" b="0" dirty="0">
+              <a:rPr lang="en-US" altLang="ko-KR" sz="1050" b="0" dirty="0">
                 <a:solidFill>
                   <a:srgbClr val="569CD6"/>
                 </a:solidFill>
@@ -4632,7 +4637,7 @@
               <a:t>Element</a:t>
             </a:r>
             <a:r>
-              <a:rPr lang="en-US" altLang="ko-KR" sz="1200" b="0" dirty="0">
+              <a:rPr lang="en-US" altLang="ko-KR" sz="1050" b="0" dirty="0">
                 <a:solidFill>
                   <a:srgbClr val="808080"/>
                 </a:solidFill>
@@ -4641,7 +4646,7 @@
               </a:rPr>
               <a:t>&gt;</a:t>
             </a:r>
-            <a:endParaRPr lang="en-US" altLang="ko-KR" sz="1200" b="0" dirty="0">
+            <a:endParaRPr lang="en-US" altLang="ko-KR" sz="1050" b="0" dirty="0">
               <a:solidFill>
                 <a:srgbClr val="CCCCCC"/>
               </a:solidFill>
@@ -4651,7 +4656,7 @@
           </a:p>
           <a:p>
             <a:r>
-              <a:rPr lang="en-US" altLang="ko-KR" sz="1200" b="0" dirty="0">
+              <a:rPr lang="en-US" altLang="ko-KR" sz="1050" b="0" dirty="0">
                 <a:solidFill>
                   <a:srgbClr val="CCCCCC"/>
                 </a:solidFill>
@@ -4661,7 +4666,7 @@
               <a:t>        </a:t>
             </a:r>
             <a:r>
-              <a:rPr lang="en-US" altLang="ko-KR" sz="1200" b="0" dirty="0">
+              <a:rPr lang="en-US" altLang="ko-KR" sz="1050" b="0" dirty="0">
                 <a:solidFill>
                   <a:srgbClr val="808080"/>
                 </a:solidFill>
@@ -4671,7 +4676,7 @@
               <a:t>&lt;</a:t>
             </a:r>
             <a:r>
-              <a:rPr lang="en-US" altLang="ko-KR" sz="1200" b="0" dirty="0">
+              <a:rPr lang="en-US" altLang="ko-KR" sz="1050" b="0" dirty="0">
                 <a:solidFill>
                   <a:srgbClr val="569CD6"/>
                 </a:solidFill>
@@ -4681,7 +4686,7 @@
               <a:t>Element</a:t>
             </a:r>
             <a:r>
-              <a:rPr lang="en-US" altLang="ko-KR" sz="1200" b="0" dirty="0">
+              <a:rPr lang="en-US" altLang="ko-KR" sz="1050" b="0" dirty="0">
                 <a:solidFill>
                   <a:srgbClr val="CCCCCC"/>
                 </a:solidFill>
@@ -4691,7 +4696,7 @@
               <a:t> </a:t>
             </a:r>
             <a:r>
-              <a:rPr lang="en-US" altLang="ko-KR" sz="1200" b="0" dirty="0" err="1">
+              <a:rPr lang="en-US" altLang="ko-KR" sz="1050" b="0" dirty="0" err="1">
                 <a:solidFill>
                   <a:srgbClr val="9CDCFE"/>
                 </a:solidFill>
@@ -4701,7 +4706,7 @@
               <a:t>ElementType</a:t>
             </a:r>
             <a:r>
-              <a:rPr lang="en-US" altLang="ko-KR" sz="1200" b="0" dirty="0">
+              <a:rPr lang="en-US" altLang="ko-KR" sz="1050" b="0" dirty="0">
                 <a:solidFill>
                   <a:srgbClr val="CCCCCC"/>
                 </a:solidFill>
@@ -4711,7 +4716,7 @@
               <a:t>=</a:t>
             </a:r>
             <a:r>
-              <a:rPr lang="en-US" altLang="ko-KR" sz="1200" b="0" dirty="0">
+              <a:rPr lang="en-US" altLang="ko-KR" sz="1050" b="0" dirty="0">
                 <a:solidFill>
                   <a:srgbClr val="CE9178"/>
                 </a:solidFill>
@@ -4721,7 +4726,7 @@
               <a:t>"2"</a:t>
             </a:r>
             <a:r>
-              <a:rPr lang="en-US" altLang="ko-KR" sz="1200" b="0" dirty="0">
+              <a:rPr lang="en-US" altLang="ko-KR" sz="1050" b="0" dirty="0">
                 <a:solidFill>
                   <a:srgbClr val="CCCCCC"/>
                 </a:solidFill>
@@ -4731,7 +4736,7 @@
               <a:t> </a:t>
             </a:r>
             <a:r>
-              <a:rPr lang="en-US" altLang="ko-KR" sz="1200" b="0" dirty="0">
+              <a:rPr lang="en-US" altLang="ko-KR" sz="1050" b="0" dirty="0">
                 <a:solidFill>
                   <a:srgbClr val="9CDCFE"/>
                 </a:solidFill>
@@ -4741,7 +4746,7 @@
               <a:t>Coordinate</a:t>
             </a:r>
             <a:r>
-              <a:rPr lang="en-US" altLang="ko-KR" sz="1200" b="0" dirty="0">
+              <a:rPr lang="en-US" altLang="ko-KR" sz="1050" b="0" dirty="0">
                 <a:solidFill>
                   <a:srgbClr val="CCCCCC"/>
                 </a:solidFill>
@@ -4751,7 +4756,7 @@
               <a:t>=</a:t>
             </a:r>
             <a:r>
-              <a:rPr lang="en-US" altLang="ko-KR" sz="1200" b="0" dirty="0">
+              <a:rPr lang="en-US" altLang="ko-KR" sz="1050" b="0" dirty="0">
                 <a:solidFill>
                   <a:srgbClr val="CE9178"/>
                 </a:solidFill>
@@ -4761,7 +4766,7 @@
               <a:t>"1028"</a:t>
             </a:r>
             <a:r>
-              <a:rPr lang="en-US" altLang="ko-KR" sz="1200" b="0" dirty="0">
+              <a:rPr lang="en-US" altLang="ko-KR" sz="1050" b="0" dirty="0">
                 <a:solidFill>
                   <a:srgbClr val="CCCCCC"/>
                 </a:solidFill>
@@ -4771,7 +4776,7 @@
               <a:t> </a:t>
             </a:r>
             <a:r>
-              <a:rPr lang="en-US" altLang="ko-KR" sz="1200" b="0" dirty="0">
+              <a:rPr lang="en-US" altLang="ko-KR" sz="1050" b="0" dirty="0">
                 <a:solidFill>
                   <a:srgbClr val="9CDCFE"/>
                 </a:solidFill>
@@ -4781,7 +4786,7 @@
               <a:t>Param</a:t>
             </a:r>
             <a:r>
-              <a:rPr lang="en-US" altLang="ko-KR" sz="1200" b="0" dirty="0">
+              <a:rPr lang="en-US" altLang="ko-KR" sz="1050" b="0" dirty="0">
                 <a:solidFill>
                   <a:srgbClr val="CCCCCC"/>
                 </a:solidFill>
@@ -4791,7 +4796,7 @@
               <a:t>=</a:t>
             </a:r>
             <a:r>
-              <a:rPr lang="en-US" altLang="ko-KR" sz="1200" b="0" dirty="0">
+              <a:rPr lang="en-US" altLang="ko-KR" sz="1050" b="0" dirty="0">
                 <a:solidFill>
                   <a:srgbClr val="CE9178"/>
                 </a:solidFill>
@@ -4801,7 +4806,7 @@
               <a:t>"87"</a:t>
             </a:r>
             <a:r>
-              <a:rPr lang="en-US" altLang="ko-KR" sz="1200" b="0" dirty="0">
+              <a:rPr lang="en-US" altLang="ko-KR" sz="1050" b="0" dirty="0">
                 <a:solidFill>
                   <a:srgbClr val="808080"/>
                 </a:solidFill>
@@ -4811,7 +4816,7 @@
               <a:t>&gt;&lt;/</a:t>
             </a:r>
             <a:r>
-              <a:rPr lang="en-US" altLang="ko-KR" sz="1200" b="0" dirty="0">
+              <a:rPr lang="en-US" altLang="ko-KR" sz="1050" b="0" dirty="0">
                 <a:solidFill>
                   <a:srgbClr val="569CD6"/>
                 </a:solidFill>
@@ -4821,7 +4826,7 @@
               <a:t>Element</a:t>
             </a:r>
             <a:r>
-              <a:rPr lang="en-US" altLang="ko-KR" sz="1200" b="0" dirty="0">
+              <a:rPr lang="en-US" altLang="ko-KR" sz="1050" b="0" dirty="0">
                 <a:solidFill>
                   <a:srgbClr val="808080"/>
                 </a:solidFill>
@@ -4830,7 +4835,7 @@
               </a:rPr>
               <a:t>&gt;</a:t>
             </a:r>
-            <a:endParaRPr lang="en-US" altLang="ko-KR" sz="1200" b="0" dirty="0">
+            <a:endParaRPr lang="en-US" altLang="ko-KR" sz="1050" b="0" dirty="0">
               <a:solidFill>
                 <a:srgbClr val="CCCCCC"/>
               </a:solidFill>
@@ -4840,7 +4845,7 @@
           </a:p>
           <a:p>
             <a:r>
-              <a:rPr lang="en-US" altLang="ko-KR" sz="1200" b="0" dirty="0">
+              <a:rPr lang="en-US" altLang="ko-KR" sz="1050" b="0" dirty="0">
                 <a:solidFill>
                   <a:srgbClr val="CCCCCC"/>
                 </a:solidFill>
@@ -4850,7 +4855,7 @@
               <a:t>        </a:t>
             </a:r>
             <a:r>
-              <a:rPr lang="en-US" altLang="ko-KR" sz="1200" b="0" dirty="0">
+              <a:rPr lang="en-US" altLang="ko-KR" sz="1050" b="0" dirty="0">
                 <a:solidFill>
                   <a:srgbClr val="808080"/>
                 </a:solidFill>
@@ -4860,7 +4865,7 @@
               <a:t>&lt;</a:t>
             </a:r>
             <a:r>
-              <a:rPr lang="en-US" altLang="ko-KR" sz="1200" b="0" dirty="0">
+              <a:rPr lang="en-US" altLang="ko-KR" sz="1050" b="0" dirty="0">
                 <a:solidFill>
                   <a:srgbClr val="569CD6"/>
                 </a:solidFill>
@@ -4870,7 +4875,7 @@
               <a:t>Element</a:t>
             </a:r>
             <a:r>
-              <a:rPr lang="en-US" altLang="ko-KR" sz="1200" b="0" dirty="0">
+              <a:rPr lang="en-US" altLang="ko-KR" sz="1050" b="0" dirty="0">
                 <a:solidFill>
                   <a:srgbClr val="CCCCCC"/>
                 </a:solidFill>
@@ -4880,7 +4885,7 @@
               <a:t> </a:t>
             </a:r>
             <a:r>
-              <a:rPr lang="en-US" altLang="ko-KR" sz="1200" b="0" dirty="0" err="1">
+              <a:rPr lang="en-US" altLang="ko-KR" sz="1050" b="0" dirty="0" err="1">
                 <a:solidFill>
                   <a:srgbClr val="9CDCFE"/>
                 </a:solidFill>
@@ -4890,7 +4895,7 @@
               <a:t>ElementType</a:t>
             </a:r>
             <a:r>
-              <a:rPr lang="en-US" altLang="ko-KR" sz="1200" b="0" dirty="0">
+              <a:rPr lang="en-US" altLang="ko-KR" sz="1050" b="0" dirty="0">
                 <a:solidFill>
                   <a:srgbClr val="CCCCCC"/>
                 </a:solidFill>
@@ -4900,7 +4905,7 @@
               <a:t>=</a:t>
             </a:r>
             <a:r>
-              <a:rPr lang="en-US" altLang="ko-KR" sz="1200" b="0" dirty="0">
+              <a:rPr lang="en-US" altLang="ko-KR" sz="1050" b="0" dirty="0">
                 <a:solidFill>
                   <a:srgbClr val="CE9178"/>
                 </a:solidFill>
@@ -4910,7 +4915,7 @@
               <a:t>"14"</a:t>
             </a:r>
             <a:r>
-              <a:rPr lang="en-US" altLang="ko-KR" sz="1200" b="0" dirty="0">
+              <a:rPr lang="en-US" altLang="ko-KR" sz="1050" b="0" dirty="0">
                 <a:solidFill>
                   <a:srgbClr val="CCCCCC"/>
                 </a:solidFill>
@@ -4920,7 +4925,7 @@
               <a:t> </a:t>
             </a:r>
             <a:r>
-              <a:rPr lang="en-US" altLang="ko-KR" sz="1200" b="0" dirty="0">
+              <a:rPr lang="en-US" altLang="ko-KR" sz="1050" b="0" dirty="0">
                 <a:solidFill>
                   <a:srgbClr val="9CDCFE"/>
                 </a:solidFill>
@@ -4930,7 +4935,7 @@
               <a:t>Coordinate</a:t>
             </a:r>
             <a:r>
-              <a:rPr lang="en-US" altLang="ko-KR" sz="1200" b="0" dirty="0">
+              <a:rPr lang="en-US" altLang="ko-KR" sz="1050" b="0" dirty="0">
                 <a:solidFill>
                   <a:srgbClr val="CCCCCC"/>
                 </a:solidFill>
@@ -4940,7 +4945,7 @@
               <a:t>=</a:t>
             </a:r>
             <a:r>
-              <a:rPr lang="en-US" altLang="ko-KR" sz="1200" b="0" dirty="0">
+              <a:rPr lang="en-US" altLang="ko-KR" sz="1050" b="0" dirty="0">
                 <a:solidFill>
                   <a:srgbClr val="CE9178"/>
                 </a:solidFill>
@@ -4950,7 +4955,7 @@
               <a:t>"1118"</a:t>
             </a:r>
             <a:r>
-              <a:rPr lang="en-US" altLang="ko-KR" sz="1200" b="0" dirty="0">
+              <a:rPr lang="en-US" altLang="ko-KR" sz="1050" b="0" dirty="0">
                 <a:solidFill>
                   <a:srgbClr val="808080"/>
                 </a:solidFill>
@@ -4960,7 +4965,7 @@
               <a:t>&gt;</a:t>
             </a:r>
             <a:r>
-              <a:rPr lang="en-US" altLang="ko-KR" sz="1200" b="0" dirty="0">
+              <a:rPr lang="en-US" altLang="ko-KR" sz="1050" b="0" dirty="0">
                 <a:solidFill>
                   <a:srgbClr val="CCCCCC"/>
                 </a:solidFill>
@@ -4970,7 +4975,7 @@
               <a:t>M00001</a:t>
             </a:r>
             <a:r>
-              <a:rPr lang="en-US" altLang="ko-KR" sz="1200" b="0" dirty="0">
+              <a:rPr lang="en-US" altLang="ko-KR" sz="1050" b="0" dirty="0">
                 <a:solidFill>
                   <a:srgbClr val="808080"/>
                 </a:solidFill>
@@ -4980,7 +4985,7 @@
               <a:t>&lt;/</a:t>
             </a:r>
             <a:r>
-              <a:rPr lang="en-US" altLang="ko-KR" sz="1200" b="0" dirty="0">
+              <a:rPr lang="en-US" altLang="ko-KR" sz="1050" b="0" dirty="0">
                 <a:solidFill>
                   <a:srgbClr val="569CD6"/>
                 </a:solidFill>
@@ -4990,7 +4995,7 @@
               <a:t>Element</a:t>
             </a:r>
             <a:r>
-              <a:rPr lang="en-US" altLang="ko-KR" sz="1200" b="0" dirty="0">
+              <a:rPr lang="en-US" altLang="ko-KR" sz="1050" b="0" dirty="0">
                 <a:solidFill>
                   <a:srgbClr val="808080"/>
                 </a:solidFill>
@@ -4999,7 +5004,7 @@
               </a:rPr>
               <a:t>&gt;</a:t>
             </a:r>
-            <a:endParaRPr lang="en-US" altLang="ko-KR" sz="1200" b="0" dirty="0">
+            <a:endParaRPr lang="en-US" altLang="ko-KR" sz="1050" b="0" dirty="0">
               <a:solidFill>
                 <a:srgbClr val="CCCCCC"/>
               </a:solidFill>
@@ -5009,7 +5014,7 @@
           </a:p>
           <a:p>
             <a:r>
-              <a:rPr lang="en-US" altLang="ko-KR" sz="1200" b="0" dirty="0">
+              <a:rPr lang="en-US" altLang="ko-KR" sz="1050" b="0" dirty="0">
                 <a:solidFill>
                   <a:srgbClr val="CCCCCC"/>
                 </a:solidFill>
@@ -5019,7 +5024,7 @@
               <a:t>    </a:t>
             </a:r>
             <a:r>
-              <a:rPr lang="en-US" altLang="ko-KR" sz="1200" b="0" dirty="0">
+              <a:rPr lang="en-US" altLang="ko-KR" sz="1050" b="0" dirty="0">
                 <a:solidFill>
                   <a:srgbClr val="808080"/>
                 </a:solidFill>
@@ -5029,7 +5034,7 @@
               <a:t>&lt;/</a:t>
             </a:r>
             <a:r>
-              <a:rPr lang="en-US" altLang="ko-KR" sz="1200" b="0" dirty="0">
+              <a:rPr lang="en-US" altLang="ko-KR" sz="1050" b="0" dirty="0">
                 <a:solidFill>
                   <a:srgbClr val="569CD6"/>
                 </a:solidFill>
@@ -5039,7 +5044,7 @@
               <a:t>Rung</a:t>
             </a:r>
             <a:r>
-              <a:rPr lang="en-US" altLang="ko-KR" sz="1200" b="0" dirty="0">
+              <a:rPr lang="en-US" altLang="ko-KR" sz="1050" b="0" dirty="0">
                 <a:solidFill>
                   <a:srgbClr val="808080"/>
                 </a:solidFill>
@@ -5048,7 +5053,259 @@
               </a:rPr>
               <a:t>&gt;</a:t>
             </a:r>
-            <a:endParaRPr lang="en-US" altLang="ko-KR" sz="1200" b="0" dirty="0">
+          </a:p>
+          <a:p>
+            <a:r>
+              <a:rPr lang="en-US" altLang="ko-KR" sz="1050" b="0" dirty="0">
+                <a:solidFill>
+                  <a:srgbClr val="CCCCCC"/>
+                </a:solidFill>
+                <a:effectLst/>
+                <a:latin typeface="Consolas" panose="020B0609020204030204" pitchFamily="49" charset="0"/>
+              </a:rPr>
+              <a:t>    </a:t>
+            </a:r>
+            <a:r>
+              <a:rPr lang="en-US" altLang="ko-KR" sz="1050" b="0" dirty="0">
+                <a:solidFill>
+                  <a:srgbClr val="808080"/>
+                </a:solidFill>
+                <a:effectLst/>
+                <a:latin typeface="Consolas" panose="020B0609020204030204" pitchFamily="49" charset="0"/>
+              </a:rPr>
+              <a:t>&lt;</a:t>
+            </a:r>
+            <a:r>
+              <a:rPr lang="en-US" altLang="ko-KR" sz="1050" b="0" dirty="0">
+                <a:solidFill>
+                  <a:srgbClr val="569CD6"/>
+                </a:solidFill>
+                <a:effectLst/>
+                <a:latin typeface="Consolas" panose="020B0609020204030204" pitchFamily="49" charset="0"/>
+              </a:rPr>
+              <a:t>Rung</a:t>
+            </a:r>
+            <a:r>
+              <a:rPr lang="en-US" altLang="ko-KR" sz="1050" b="0" dirty="0">
+                <a:solidFill>
+                  <a:srgbClr val="CCCCCC"/>
+                </a:solidFill>
+                <a:effectLst/>
+                <a:latin typeface="Consolas" panose="020B0609020204030204" pitchFamily="49" charset="0"/>
+              </a:rPr>
+              <a:t> </a:t>
+            </a:r>
+            <a:r>
+              <a:rPr lang="en-US" altLang="ko-KR" sz="1050" b="0" dirty="0" err="1">
+                <a:solidFill>
+                  <a:srgbClr val="9CDCFE"/>
+                </a:solidFill>
+                <a:effectLst/>
+                <a:latin typeface="Consolas" panose="020B0609020204030204" pitchFamily="49" charset="0"/>
+              </a:rPr>
+              <a:t>BlockMask</a:t>
+            </a:r>
+            <a:r>
+              <a:rPr lang="en-US" altLang="ko-KR" sz="1050" b="0" dirty="0">
+                <a:solidFill>
+                  <a:srgbClr val="CCCCCC"/>
+                </a:solidFill>
+                <a:effectLst/>
+                <a:latin typeface="Consolas" panose="020B0609020204030204" pitchFamily="49" charset="0"/>
+              </a:rPr>
+              <a:t>=</a:t>
+            </a:r>
+            <a:r>
+              <a:rPr lang="en-US" altLang="ko-KR" sz="1050" b="0" dirty="0">
+                <a:solidFill>
+                  <a:srgbClr val="CE9178"/>
+                </a:solidFill>
+                <a:effectLst/>
+                <a:latin typeface="Consolas" panose="020B0609020204030204" pitchFamily="49" charset="0"/>
+              </a:rPr>
+              <a:t>"0"</a:t>
+            </a:r>
+            <a:r>
+              <a:rPr lang="en-US" altLang="ko-KR" sz="1050" b="0" dirty="0">
+                <a:solidFill>
+                  <a:srgbClr val="808080"/>
+                </a:solidFill>
+                <a:effectLst/>
+                <a:latin typeface="Consolas" panose="020B0609020204030204" pitchFamily="49" charset="0"/>
+              </a:rPr>
+              <a:t>&gt;&lt;</a:t>
+            </a:r>
+            <a:r>
+              <a:rPr lang="en-US" altLang="ko-KR" sz="1050" b="0" dirty="0">
+                <a:solidFill>
+                  <a:srgbClr val="569CD6"/>
+                </a:solidFill>
+                <a:effectLst/>
+                <a:latin typeface="Consolas" panose="020B0609020204030204" pitchFamily="49" charset="0"/>
+              </a:rPr>
+              <a:t>Element</a:t>
+            </a:r>
+            <a:r>
+              <a:rPr lang="en-US" altLang="ko-KR" sz="1050" b="0" dirty="0">
+                <a:solidFill>
+                  <a:srgbClr val="CCCCCC"/>
+                </a:solidFill>
+                <a:effectLst/>
+                <a:latin typeface="Consolas" panose="020B0609020204030204" pitchFamily="49" charset="0"/>
+              </a:rPr>
+              <a:t> </a:t>
+            </a:r>
+            <a:r>
+              <a:rPr lang="en-US" altLang="ko-KR" sz="1050" b="0" dirty="0" err="1">
+                <a:solidFill>
+                  <a:srgbClr val="9CDCFE"/>
+                </a:solidFill>
+                <a:effectLst/>
+                <a:latin typeface="Consolas" panose="020B0609020204030204" pitchFamily="49" charset="0"/>
+              </a:rPr>
+              <a:t>ElementType</a:t>
+            </a:r>
+            <a:r>
+              <a:rPr lang="en-US" altLang="ko-KR" sz="1050" b="0" dirty="0">
+                <a:solidFill>
+                  <a:srgbClr val="CCCCCC"/>
+                </a:solidFill>
+                <a:effectLst/>
+                <a:latin typeface="Consolas" panose="020B0609020204030204" pitchFamily="49" charset="0"/>
+              </a:rPr>
+              <a:t>=</a:t>
+            </a:r>
+            <a:r>
+              <a:rPr lang="en-US" altLang="ko-KR" sz="1050" b="0" dirty="0">
+                <a:solidFill>
+                  <a:srgbClr val="CE9178"/>
+                </a:solidFill>
+                <a:effectLst/>
+                <a:latin typeface="Consolas" panose="020B0609020204030204" pitchFamily="49" charset="0"/>
+              </a:rPr>
+              <a:t>"63"</a:t>
+            </a:r>
+            <a:r>
+              <a:rPr lang="en-US" altLang="ko-KR" sz="1050" b="0" dirty="0">
+                <a:solidFill>
+                  <a:srgbClr val="CCCCCC"/>
+                </a:solidFill>
+                <a:effectLst/>
+                <a:latin typeface="Consolas" panose="020B0609020204030204" pitchFamily="49" charset="0"/>
+              </a:rPr>
+              <a:t> </a:t>
+            </a:r>
+            <a:r>
+              <a:rPr lang="en-US" altLang="ko-KR" sz="1050" b="0" dirty="0">
+                <a:solidFill>
+                  <a:srgbClr val="9CDCFE"/>
+                </a:solidFill>
+                <a:effectLst/>
+                <a:latin typeface="Consolas" panose="020B0609020204030204" pitchFamily="49" charset="0"/>
+              </a:rPr>
+              <a:t>Coordinate</a:t>
+            </a:r>
+            <a:r>
+              <a:rPr lang="en-US" altLang="ko-KR" sz="1050" b="0" dirty="0">
+                <a:solidFill>
+                  <a:srgbClr val="CCCCCC"/>
+                </a:solidFill>
+                <a:effectLst/>
+                <a:latin typeface="Consolas" panose="020B0609020204030204" pitchFamily="49" charset="0"/>
+              </a:rPr>
+              <a:t>=</a:t>
+            </a:r>
+            <a:r>
+              <a:rPr lang="en-US" altLang="ko-KR" sz="1050" b="0" dirty="0">
+                <a:solidFill>
+                  <a:srgbClr val="CE9178"/>
+                </a:solidFill>
+                <a:effectLst/>
+                <a:latin typeface="Consolas" panose="020B0609020204030204" pitchFamily="49" charset="0"/>
+              </a:rPr>
+              <a:t>"2049"</a:t>
+            </a:r>
+            <a:r>
+              <a:rPr lang="en-US" altLang="ko-KR" sz="1050" b="0" dirty="0">
+                <a:solidFill>
+                  <a:srgbClr val="808080"/>
+                </a:solidFill>
+                <a:effectLst/>
+                <a:latin typeface="Consolas" panose="020B0609020204030204" pitchFamily="49" charset="0"/>
+              </a:rPr>
+              <a:t>&gt;</a:t>
+            </a:r>
+            <a:r>
+              <a:rPr lang="ko-KR" altLang="en-US" sz="1050" b="0" dirty="0">
+                <a:solidFill>
+                  <a:srgbClr val="CCCCCC"/>
+                </a:solidFill>
+                <a:effectLst/>
+                <a:latin typeface="Consolas" panose="020B0609020204030204" pitchFamily="49" charset="0"/>
+              </a:rPr>
+              <a:t>조건에 의한 </a:t>
+            </a:r>
+            <a:r>
+              <a:rPr lang="en-US" altLang="ko-KR" sz="1050" b="0" dirty="0">
+                <a:solidFill>
+                  <a:srgbClr val="CCCCCC"/>
+                </a:solidFill>
+                <a:effectLst/>
+                <a:latin typeface="Consolas" panose="020B0609020204030204" pitchFamily="49" charset="0"/>
+              </a:rPr>
+              <a:t>Timer reset</a:t>
+            </a:r>
+            <a:r>
+              <a:rPr lang="en-US" altLang="ko-KR" sz="1050" b="0" dirty="0">
+                <a:solidFill>
+                  <a:srgbClr val="808080"/>
+                </a:solidFill>
+                <a:effectLst/>
+                <a:latin typeface="Consolas" panose="020B0609020204030204" pitchFamily="49" charset="0"/>
+              </a:rPr>
+              <a:t>&lt;/</a:t>
+            </a:r>
+            <a:r>
+              <a:rPr lang="en-US" altLang="ko-KR" sz="1050" b="0" dirty="0">
+                <a:solidFill>
+                  <a:srgbClr val="569CD6"/>
+                </a:solidFill>
+                <a:effectLst/>
+                <a:latin typeface="Consolas" panose="020B0609020204030204" pitchFamily="49" charset="0"/>
+              </a:rPr>
+              <a:t>Element</a:t>
+            </a:r>
+            <a:r>
+              <a:rPr lang="en-US" altLang="ko-KR" sz="1050" b="0" dirty="0">
+                <a:solidFill>
+                  <a:srgbClr val="808080"/>
+                </a:solidFill>
+                <a:effectLst/>
+                <a:latin typeface="Consolas" panose="020B0609020204030204" pitchFamily="49" charset="0"/>
+              </a:rPr>
+              <a:t>&gt;&lt;/</a:t>
+            </a:r>
+            <a:r>
+              <a:rPr lang="en-US" altLang="ko-KR" sz="1050" b="0" dirty="0">
+                <a:solidFill>
+                  <a:srgbClr val="569CD6"/>
+                </a:solidFill>
+                <a:effectLst/>
+                <a:latin typeface="Consolas" panose="020B0609020204030204" pitchFamily="49" charset="0"/>
+              </a:rPr>
+              <a:t>Rung</a:t>
+            </a:r>
+            <a:r>
+              <a:rPr lang="en-US" altLang="ko-KR" sz="1050" b="0" dirty="0">
+                <a:solidFill>
+                  <a:srgbClr val="808080"/>
+                </a:solidFill>
+                <a:effectLst/>
+                <a:latin typeface="Consolas" panose="020B0609020204030204" pitchFamily="49" charset="0"/>
+              </a:rPr>
+              <a:t>&gt;</a:t>
+            </a:r>
+            <a:endParaRPr lang="en-US" altLang="ko-KR" sz="1050" b="0" dirty="0">
               <a:solidFill>
                 <a:srgbClr val="CCCCCC"/>
               </a:solidFill>
@@ -5058,7 +5315,7 @@
           </a:p>
           <a:p>
             <a:r>
-              <a:rPr lang="en-US" altLang="ko-KR" sz="1200" b="0" dirty="0">
+              <a:rPr lang="en-US" altLang="ko-KR" sz="1050" b="0" dirty="0">
                 <a:solidFill>
                   <a:srgbClr val="CCCCCC"/>
                 </a:solidFill>
@@ -5068,7 +5325,7 @@
               <a:t>    </a:t>
             </a:r>
             <a:r>
-              <a:rPr lang="en-US" altLang="ko-KR" sz="1200" b="0" dirty="0">
+              <a:rPr lang="en-US" altLang="ko-KR" sz="1050" b="0" dirty="0">
                 <a:solidFill>
                   <a:srgbClr val="808080"/>
                 </a:solidFill>
@@ -5078,17 +5335,17 @@
               <a:t>&lt;</a:t>
             </a:r>
             <a:r>
-              <a:rPr lang="en-US" altLang="ko-KR" sz="1200" b="0" dirty="0" err="1">
+              <a:rPr lang="en-US" altLang="ko-KR" sz="1050" b="0" dirty="0">
                 <a:solidFill>
                   <a:srgbClr val="569CD6"/>
                 </a:solidFill>
                 <a:effectLst/>
                 <a:latin typeface="Consolas" panose="020B0609020204030204" pitchFamily="49" charset="0"/>
               </a:rPr>
-              <a:t>OnlineUploadData</a:t>
-            </a:r>
-            <a:r>
-              <a:rPr lang="en-US" altLang="ko-KR" sz="1200" b="0" dirty="0">
+              <a:t>Rung</a:t>
+            </a:r>
+            <a:r>
+              <a:rPr lang="en-US" altLang="ko-KR" sz="1050" b="0" dirty="0">
                 <a:solidFill>
                   <a:srgbClr val="CCCCCC"/>
                 </a:solidFill>
@@ -5098,17 +5355,17 @@
               <a:t> </a:t>
             </a:r>
             <a:r>
-              <a:rPr lang="en-US" altLang="ko-KR" sz="1200" b="0" dirty="0">
+              <a:rPr lang="en-US" altLang="ko-KR" sz="1050" b="0" dirty="0" err="1">
                 <a:solidFill>
                   <a:srgbClr val="9CDCFE"/>
                 </a:solidFill>
                 <a:effectLst/>
                 <a:latin typeface="Consolas" panose="020B0609020204030204" pitchFamily="49" charset="0"/>
               </a:rPr>
-              <a:t>Compressed</a:t>
-            </a:r>
-            <a:r>
-              <a:rPr lang="en-US" altLang="ko-KR" sz="1200" b="0" dirty="0">
+              <a:t>BlockMask</a:t>
+            </a:r>
+            <a:r>
+              <a:rPr lang="en-US" altLang="ko-KR" sz="1050" b="0" dirty="0">
                 <a:solidFill>
                   <a:srgbClr val="CCCCCC"/>
                 </a:solidFill>
@@ -5118,17 +5375,37 @@
               <a:t>=</a:t>
             </a:r>
             <a:r>
-              <a:rPr lang="en-US" altLang="ko-KR" sz="1200" b="0" dirty="0">
+              <a:rPr lang="en-US" altLang="ko-KR" sz="1050" b="0" dirty="0">
                 <a:solidFill>
                   <a:srgbClr val="CE9178"/>
                 </a:solidFill>
                 <a:effectLst/>
                 <a:latin typeface="Consolas" panose="020B0609020204030204" pitchFamily="49" charset="0"/>
               </a:rPr>
-              <a:t>"1"</a:t>
-            </a:r>
-            <a:r>
-              <a:rPr lang="en-US" altLang="ko-KR" sz="1200" b="0" dirty="0">
+              <a:t>"0"</a:t>
+            </a:r>
+            <a:r>
+              <a:rPr lang="en-US" altLang="ko-KR" sz="1050" b="0" dirty="0">
+                <a:solidFill>
+                  <a:srgbClr val="808080"/>
+                </a:solidFill>
+                <a:effectLst/>
+                <a:latin typeface="Consolas" panose="020B0609020204030204" pitchFamily="49" charset="0"/>
+              </a:rPr>
+              <a:t>&gt;&lt;</a:t>
+            </a:r>
+            <a:r>
+              <a:rPr lang="en-US" altLang="ko-KR" sz="1050" b="0" dirty="0">
+                <a:solidFill>
+                  <a:srgbClr val="569CD6"/>
+                </a:solidFill>
+                <a:effectLst/>
+                <a:latin typeface="Consolas" panose="020B0609020204030204" pitchFamily="49" charset="0"/>
+              </a:rPr>
+              <a:t>Element</a:t>
+            </a:r>
+            <a:r>
+              <a:rPr lang="en-US" altLang="ko-KR" sz="1050" b="0" dirty="0">
                 <a:solidFill>
                   <a:srgbClr val="CCCCCC"/>
                 </a:solidFill>
@@ -5138,19 +5415,19 @@
               <a:t> </a:t>
             </a:r>
             <a:r>
-              <a:rPr lang="en-US" altLang="ko-KR" sz="1200" b="0" dirty="0" err="1">
+              <a:rPr lang="en-US" altLang="ko-KR" sz="1050" b="0" dirty="0" err="1">
                 <a:solidFill>
                   <a:srgbClr val="9CDCFE"/>
                 </a:solidFill>
                 <a:effectLst/>
                 <a:latin typeface="Consolas" panose="020B0609020204030204" pitchFamily="49" charset="0"/>
               </a:rPr>
-              <a:t>dt:dt</a:t>
-            </a:r>
-            <a:r>
-              <a:rPr lang="en-US" altLang="ko-KR" sz="1200" b="0" dirty="0">
-                <a:solidFill>
-                  <a:srgbClr val="CCCCCC"/>
+              <a:t>ElementType</a:t>
+            </a:r>
+            <a:r>
+              <a:rPr lang="en-US" altLang="ko-KR" sz="1050" b="0" dirty="0">
+                <a:solidFill>
+                  <a:srgbClr val="FF0000"/>
                 </a:solidFill>
                 <a:effectLst/>
                 <a:latin typeface="Consolas" panose="020B0609020204030204" pitchFamily="49" charset="0"/>
@@ -5158,16 +5435,106 @@
               <a:t>=</a:t>
             </a:r>
             <a:r>
-              <a:rPr lang="en-US" altLang="ko-KR" sz="1200" b="0" dirty="0">
+              <a:rPr lang="en-US" altLang="ko-KR" sz="1050" b="1" dirty="0">
+                <a:solidFill>
+                  <a:srgbClr val="FF0000"/>
+                </a:solidFill>
+                <a:effectLst/>
+                <a:latin typeface="Consolas" panose="020B0609020204030204" pitchFamily="49" charset="0"/>
+              </a:rPr>
+              <a:t>"8"</a:t>
+            </a:r>
+            <a:r>
+              <a:rPr lang="en-US" altLang="ko-KR" sz="1050" b="0" dirty="0">
+                <a:solidFill>
+                  <a:srgbClr val="CCCCCC"/>
+                </a:solidFill>
+                <a:effectLst/>
+                <a:latin typeface="Consolas" panose="020B0609020204030204" pitchFamily="49" charset="0"/>
+              </a:rPr>
+              <a:t> </a:t>
+            </a:r>
+            <a:r>
+              <a:rPr lang="en-US" altLang="ko-KR" sz="1050" b="0" dirty="0">
+                <a:solidFill>
+                  <a:srgbClr val="9CDCFE"/>
+                </a:solidFill>
+                <a:effectLst/>
+                <a:latin typeface="Consolas" panose="020B0609020204030204" pitchFamily="49" charset="0"/>
+              </a:rPr>
+              <a:t>Coordinate</a:t>
+            </a:r>
+            <a:r>
+              <a:rPr lang="en-US" altLang="ko-KR" sz="1050" b="0" dirty="0">
+                <a:solidFill>
+                  <a:srgbClr val="CCCCCC"/>
+                </a:solidFill>
+                <a:effectLst/>
+                <a:latin typeface="Consolas" panose="020B0609020204030204" pitchFamily="49" charset="0"/>
+              </a:rPr>
+              <a:t>=</a:t>
+            </a:r>
+            <a:r>
+              <a:rPr lang="en-US" altLang="ko-KR" sz="1050" b="0" dirty="0">
                 <a:solidFill>
                   <a:srgbClr val="CE9178"/>
                 </a:solidFill>
                 <a:effectLst/>
                 <a:latin typeface="Consolas" panose="020B0609020204030204" pitchFamily="49" charset="0"/>
               </a:rPr>
-              <a:t>"bin.base64"</a:t>
-            </a:r>
-            <a:endParaRPr lang="en-US" altLang="ko-KR" sz="1200" b="0" dirty="0">
+              <a:t>"3073"</a:t>
+            </a:r>
+            <a:r>
+              <a:rPr lang="en-US" altLang="ko-KR" sz="1050" b="0" dirty="0">
+                <a:solidFill>
+                  <a:srgbClr val="808080"/>
+                </a:solidFill>
+                <a:effectLst/>
+                <a:latin typeface="Consolas" panose="020B0609020204030204" pitchFamily="49" charset="0"/>
+              </a:rPr>
+              <a:t>&gt;</a:t>
+            </a:r>
+            <a:r>
+              <a:rPr lang="en-US" altLang="ko-KR" sz="1050" b="0" dirty="0">
+                <a:solidFill>
+                  <a:srgbClr val="CCCCCC"/>
+                </a:solidFill>
+                <a:effectLst/>
+                <a:latin typeface="Consolas" panose="020B0609020204030204" pitchFamily="49" charset="0"/>
+              </a:rPr>
+              <a:t>M00000</a:t>
+            </a:r>
+            <a:r>
+              <a:rPr lang="en-US" altLang="ko-KR" sz="1050" b="0" dirty="0">
+                <a:solidFill>
+                  <a:srgbClr val="808080"/>
+                </a:solidFill>
+                <a:effectLst/>
+                <a:latin typeface="Consolas" panose="020B0609020204030204" pitchFamily="49" charset="0"/>
+              </a:rPr>
+              <a:t>&lt;/</a:t>
+            </a:r>
+            <a:r>
+              <a:rPr lang="en-US" altLang="ko-KR" sz="1050" b="0" dirty="0">
+                <a:solidFill>
+                  <a:srgbClr val="569CD6"/>
+                </a:solidFill>
+                <a:effectLst/>
+                <a:latin typeface="Consolas" panose="020B0609020204030204" pitchFamily="49" charset="0"/>
+              </a:rPr>
+              <a:t>Element</a:t>
+            </a:r>
+            <a:r>
+              <a:rPr lang="en-US" altLang="ko-KR" sz="1050" b="0" dirty="0">
+                <a:solidFill>
+                  <a:srgbClr val="808080"/>
+                </a:solidFill>
+                <a:effectLst/>
+                <a:latin typeface="Consolas" panose="020B0609020204030204" pitchFamily="49" charset="0"/>
+              </a:rPr>
+              <a:t>&gt;</a:t>
+            </a:r>
+            <a:endParaRPr lang="en-US" altLang="ko-KR" sz="1050" b="0" dirty="0">
               <a:solidFill>
                 <a:srgbClr val="CCCCCC"/>
               </a:solidFill>
@@ -5177,7 +5544,7 @@
           </a:p>
           <a:p>
             <a:r>
-              <a:rPr lang="en-US" altLang="ko-KR" sz="1200" b="0" dirty="0">
+              <a:rPr lang="en-US" altLang="ko-KR" sz="1050" b="0" dirty="0">
                 <a:solidFill>
                   <a:srgbClr val="CCCCCC"/>
                 </a:solidFill>
@@ -5187,17 +5554,47 @@
               <a:t>        </a:t>
             </a:r>
             <a:r>
-              <a:rPr lang="en-US" altLang="ko-KR" sz="1200" b="0" dirty="0" err="1">
+              <a:rPr lang="en-US" altLang="ko-KR" sz="1050" b="0" dirty="0">
+                <a:solidFill>
+                  <a:srgbClr val="808080"/>
+                </a:solidFill>
+                <a:effectLst/>
+                <a:latin typeface="Consolas" panose="020B0609020204030204" pitchFamily="49" charset="0"/>
+              </a:rPr>
+              <a:t>&lt;</a:t>
+            </a:r>
+            <a:r>
+              <a:rPr lang="en-US" altLang="ko-KR" sz="1050" b="0" dirty="0">
+                <a:solidFill>
+                  <a:srgbClr val="569CD6"/>
+                </a:solidFill>
+                <a:effectLst/>
+                <a:latin typeface="Consolas" panose="020B0609020204030204" pitchFamily="49" charset="0"/>
+              </a:rPr>
+              <a:t>Element</a:t>
+            </a:r>
+            <a:r>
+              <a:rPr lang="en-US" altLang="ko-KR" sz="1050" b="0" dirty="0">
+                <a:solidFill>
+                  <a:srgbClr val="CCCCCC"/>
+                </a:solidFill>
+                <a:effectLst/>
+                <a:latin typeface="Consolas" panose="020B0609020204030204" pitchFamily="49" charset="0"/>
+              </a:rPr>
+              <a:t> </a:t>
+            </a:r>
+            <a:r>
+              <a:rPr lang="en-US" altLang="ko-KR" sz="1050" b="0" dirty="0" err="1">
                 <a:solidFill>
                   <a:srgbClr val="9CDCFE"/>
                 </a:solidFill>
                 <a:effectLst/>
                 <a:latin typeface="Consolas" panose="020B0609020204030204" pitchFamily="49" charset="0"/>
               </a:rPr>
-              <a:t>xmlns:dt</a:t>
-            </a:r>
-            <a:r>
-              <a:rPr lang="en-US" altLang="ko-KR" sz="1200" b="0" dirty="0">
+              <a:t>ElementType</a:t>
+            </a:r>
+            <a:r>
+              <a:rPr lang="en-US" altLang="ko-KR" sz="1050" b="0" dirty="0">
                 <a:solidFill>
                   <a:srgbClr val="CCCCCC"/>
                 </a:solidFill>
@@ -5207,37 +5604,117 @@
               <a:t>=</a:t>
             </a:r>
             <a:r>
-              <a:rPr lang="en-US" altLang="ko-KR" sz="1200" b="0" dirty="0">
+              <a:rPr lang="en-US" altLang="ko-KR" sz="1050" b="0" dirty="0">
                 <a:solidFill>
                   <a:srgbClr val="CE9178"/>
                 </a:solidFill>
                 <a:effectLst/>
                 <a:latin typeface="Consolas" panose="020B0609020204030204" pitchFamily="49" charset="0"/>
               </a:rPr>
-              <a:t>"</a:t>
-            </a:r>
-            <a:r>
-              <a:rPr lang="en-US" altLang="ko-KR" sz="1200" b="0" dirty="0" err="1">
+              <a:t>"2"</a:t>
+            </a:r>
+            <a:r>
+              <a:rPr lang="en-US" altLang="ko-KR" sz="1050" b="0" dirty="0">
+                <a:solidFill>
+                  <a:srgbClr val="CCCCCC"/>
+                </a:solidFill>
+                <a:effectLst/>
+                <a:latin typeface="Consolas" panose="020B0609020204030204" pitchFamily="49" charset="0"/>
+              </a:rPr>
+              <a:t> </a:t>
+            </a:r>
+            <a:r>
+              <a:rPr lang="en-US" altLang="ko-KR" sz="1050" b="0" dirty="0">
+                <a:solidFill>
+                  <a:srgbClr val="9CDCFE"/>
+                </a:solidFill>
+                <a:effectLst/>
+                <a:latin typeface="Consolas" panose="020B0609020204030204" pitchFamily="49" charset="0"/>
+              </a:rPr>
+              <a:t>Coordinate</a:t>
+            </a:r>
+            <a:r>
+              <a:rPr lang="en-US" altLang="ko-KR" sz="1050" b="0" dirty="0">
+                <a:solidFill>
+                  <a:srgbClr val="CCCCCC"/>
+                </a:solidFill>
+                <a:effectLst/>
+                <a:latin typeface="Consolas" panose="020B0609020204030204" pitchFamily="49" charset="0"/>
+              </a:rPr>
+              <a:t>=</a:t>
+            </a:r>
+            <a:r>
+              <a:rPr lang="en-US" altLang="ko-KR" sz="1050" b="0" dirty="0">
                 <a:solidFill>
                   <a:srgbClr val="CE9178"/>
                 </a:solidFill>
                 <a:effectLst/>
                 <a:latin typeface="Consolas" panose="020B0609020204030204" pitchFamily="49" charset="0"/>
               </a:rPr>
-              <a:t>urn:schemas-microsoft-com:datatypes</a:t>
-            </a:r>
-            <a:r>
-              <a:rPr lang="en-US" altLang="ko-KR" sz="1200" b="0" dirty="0">
+              <a:t>"3076"</a:t>
+            </a:r>
+            <a:r>
+              <a:rPr lang="en-US" altLang="ko-KR" sz="1050" b="0" dirty="0">
+                <a:solidFill>
+                  <a:srgbClr val="CCCCCC"/>
+                </a:solidFill>
+                <a:effectLst/>
+                <a:latin typeface="Consolas" panose="020B0609020204030204" pitchFamily="49" charset="0"/>
+              </a:rPr>
+              <a:t> </a:t>
+            </a:r>
+            <a:r>
+              <a:rPr lang="en-US" altLang="ko-KR" sz="1050" b="0" dirty="0">
+                <a:solidFill>
+                  <a:srgbClr val="9CDCFE"/>
+                </a:solidFill>
+                <a:effectLst/>
+                <a:latin typeface="Consolas" panose="020B0609020204030204" pitchFamily="49" charset="0"/>
+              </a:rPr>
+              <a:t>Param</a:t>
+            </a:r>
+            <a:r>
+              <a:rPr lang="en-US" altLang="ko-KR" sz="1050" b="0" dirty="0">
+                <a:solidFill>
+                  <a:srgbClr val="CCCCCC"/>
+                </a:solidFill>
+                <a:effectLst/>
+                <a:latin typeface="Consolas" panose="020B0609020204030204" pitchFamily="49" charset="0"/>
+              </a:rPr>
+              <a:t>=</a:t>
+            </a:r>
+            <a:r>
+              <a:rPr lang="en-US" altLang="ko-KR" sz="1050" b="0" dirty="0">
                 <a:solidFill>
                   <a:srgbClr val="CE9178"/>
                 </a:solidFill>
                 <a:effectLst/>
                 <a:latin typeface="Consolas" panose="020B0609020204030204" pitchFamily="49" charset="0"/>
               </a:rPr>
-              <a:t>"</a:t>
-            </a:r>
-            <a:r>
-              <a:rPr lang="en-US" altLang="ko-KR" sz="1200" b="0" dirty="0">
+              <a:t>"87"</a:t>
+            </a:r>
+            <a:r>
+              <a:rPr lang="en-US" altLang="ko-KR" sz="1050" b="0" dirty="0">
+                <a:solidFill>
+                  <a:srgbClr val="808080"/>
+                </a:solidFill>
+                <a:effectLst/>
+                <a:latin typeface="Consolas" panose="020B0609020204030204" pitchFamily="49" charset="0"/>
+              </a:rPr>
+              <a:t>&gt;&lt;/</a:t>
+            </a:r>
+            <a:r>
+              <a:rPr lang="en-US" altLang="ko-KR" sz="1050" b="0" dirty="0">
+                <a:solidFill>
+                  <a:srgbClr val="569CD6"/>
+                </a:solidFill>
+                <a:effectLst/>
+                <a:latin typeface="Consolas" panose="020B0609020204030204" pitchFamily="49" charset="0"/>
+              </a:rPr>
+              <a:t>Element</a:t>
+            </a:r>
+            <a:r>
+              <a:rPr lang="en-US" altLang="ko-KR" sz="1050" b="0" dirty="0">
                 <a:solidFill>
                   <a:srgbClr val="808080"/>
                 </a:solidFill>
@@ -5246,7 +5723,7 @@
               </a:rPr>
               <a:t>&gt;</a:t>
             </a:r>
-            <a:endParaRPr lang="en-US" altLang="ko-KR" sz="1200" b="0" dirty="0">
+            <a:endParaRPr lang="en-US" altLang="ko-KR" sz="1050" b="0" dirty="0">
               <a:solidFill>
                 <a:srgbClr val="CCCCCC"/>
               </a:solidFill>
@@ -5256,17 +5733,87 @@
           </a:p>
           <a:p>
             <a:r>
-              <a:rPr lang="en-US" altLang="ko-KR" sz="1200" b="0" dirty="0" err="1">
-                <a:solidFill>
-                  <a:srgbClr val="CCCCCC"/>
-                </a:solidFill>
-                <a:effectLst/>
-                <a:latin typeface="Consolas" panose="020B0609020204030204" pitchFamily="49" charset="0"/>
-              </a:rPr>
-              <a:t>QlpoORdyRThQkAAAAAA</a:t>
-            </a:r>
-            <a:r>
-              <a:rPr lang="en-US" altLang="ko-KR" sz="1200" b="0" dirty="0">
+              <a:rPr lang="en-US" altLang="ko-KR" sz="1050" b="0" dirty="0">
+                <a:solidFill>
+                  <a:srgbClr val="CCCCCC"/>
+                </a:solidFill>
+                <a:effectLst/>
+                <a:latin typeface="Consolas" panose="020B0609020204030204" pitchFamily="49" charset="0"/>
+              </a:rPr>
+              <a:t>        </a:t>
+            </a:r>
+            <a:r>
+              <a:rPr lang="en-US" altLang="ko-KR" sz="1050" b="0" dirty="0">
+                <a:solidFill>
+                  <a:srgbClr val="808080"/>
+                </a:solidFill>
+                <a:effectLst/>
+                <a:latin typeface="Consolas" panose="020B0609020204030204" pitchFamily="49" charset="0"/>
+              </a:rPr>
+              <a:t>&lt;</a:t>
+            </a:r>
+            <a:r>
+              <a:rPr lang="en-US" altLang="ko-KR" sz="1050" b="0" dirty="0">
+                <a:solidFill>
+                  <a:srgbClr val="569CD6"/>
+                </a:solidFill>
+                <a:effectLst/>
+                <a:latin typeface="Consolas" panose="020B0609020204030204" pitchFamily="49" charset="0"/>
+              </a:rPr>
+              <a:t>Element</a:t>
+            </a:r>
+            <a:r>
+              <a:rPr lang="en-US" altLang="ko-KR" sz="1050" b="0" dirty="0">
+                <a:solidFill>
+                  <a:srgbClr val="CCCCCC"/>
+                </a:solidFill>
+                <a:effectLst/>
+                <a:latin typeface="Consolas" panose="020B0609020204030204" pitchFamily="49" charset="0"/>
+              </a:rPr>
+              <a:t> </a:t>
+            </a:r>
+            <a:r>
+              <a:rPr lang="en-US" altLang="ko-KR" sz="1050" b="0" dirty="0" err="1">
+                <a:solidFill>
+                  <a:srgbClr val="9CDCFE"/>
+                </a:solidFill>
+                <a:effectLst/>
+                <a:latin typeface="Consolas" panose="020B0609020204030204" pitchFamily="49" charset="0"/>
+              </a:rPr>
+              <a:t>ElementType</a:t>
+            </a:r>
+            <a:r>
+              <a:rPr lang="en-US" altLang="ko-KR" sz="1050" b="1" dirty="0">
+                <a:solidFill>
+                  <a:srgbClr val="FF0000"/>
+                </a:solidFill>
+                <a:effectLst/>
+                <a:latin typeface="Consolas" panose="020B0609020204030204" pitchFamily="49" charset="0"/>
+              </a:rPr>
+              <a:t>="17"</a:t>
+            </a:r>
+            <a:r>
+              <a:rPr lang="en-US" altLang="ko-KR" sz="1050" b="0" dirty="0">
+                <a:solidFill>
+                  <a:srgbClr val="CCCCCC"/>
+                </a:solidFill>
+                <a:effectLst/>
+                <a:latin typeface="Consolas" panose="020B0609020204030204" pitchFamily="49" charset="0"/>
+              </a:rPr>
+              <a:t> </a:t>
+            </a:r>
+            <a:r>
+              <a:rPr lang="en-US" altLang="ko-KR" sz="1050" b="0" dirty="0">
+                <a:solidFill>
+                  <a:srgbClr val="9CDCFE"/>
+                </a:solidFill>
+                <a:effectLst/>
+                <a:latin typeface="Consolas" panose="020B0609020204030204" pitchFamily="49" charset="0"/>
+              </a:rPr>
+              <a:t>Coordinate</a:t>
+            </a:r>
+            <a:r>
+              <a:rPr lang="en-US" altLang="ko-KR" sz="1050" b="0" dirty="0">
                 <a:solidFill>
                   <a:srgbClr val="CCCCCC"/>
                 </a:solidFill>
@@ -5276,7 +5823,37 @@
               <a:t>=</a:t>
             </a:r>
             <a:r>
-              <a:rPr lang="en-US" altLang="ko-KR" sz="1200" b="0" dirty="0">
+              <a:rPr lang="en-US" altLang="ko-KR" sz="1050" b="0" dirty="0">
+                <a:solidFill>
+                  <a:srgbClr val="CE9178"/>
+                </a:solidFill>
+                <a:effectLst/>
+                <a:latin typeface="Consolas" panose="020B0609020204030204" pitchFamily="49" charset="0"/>
+              </a:rPr>
+              <a:t>"3166"</a:t>
+            </a:r>
+            <a:r>
+              <a:rPr lang="en-US" altLang="ko-KR" sz="1050" b="0" dirty="0">
+                <a:solidFill>
+                  <a:srgbClr val="808080"/>
+                </a:solidFill>
+                <a:effectLst/>
+                <a:latin typeface="Consolas" panose="020B0609020204030204" pitchFamily="49" charset="0"/>
+              </a:rPr>
+              <a:t>&gt;</a:t>
+            </a:r>
+            <a:r>
+              <a:rPr lang="en-US" altLang="ko-KR" sz="1050" b="0" dirty="0">
+                <a:solidFill>
+                  <a:srgbClr val="CCCCCC"/>
+                </a:solidFill>
+                <a:effectLst/>
+                <a:latin typeface="Consolas" panose="020B0609020204030204" pitchFamily="49" charset="0"/>
+              </a:rPr>
+              <a:t>T0000</a:t>
+            </a:r>
+            <a:r>
+              <a:rPr lang="en-US" altLang="ko-KR" sz="1050" b="0" dirty="0">
                 <a:solidFill>
                   <a:srgbClr val="808080"/>
                 </a:solidFill>
@@ -5286,17 +5863,17 @@
               <a:t>&lt;/</a:t>
             </a:r>
             <a:r>
-              <a:rPr lang="en-US" altLang="ko-KR" sz="1200" b="0" dirty="0" err="1">
+              <a:rPr lang="en-US" altLang="ko-KR" sz="1050" b="0" dirty="0">
                 <a:solidFill>
                   <a:srgbClr val="569CD6"/>
                 </a:solidFill>
                 <a:effectLst/>
                 <a:latin typeface="Consolas" panose="020B0609020204030204" pitchFamily="49" charset="0"/>
               </a:rPr>
-              <a:t>OnlineUploadData</a:t>
-            </a:r>
-            <a:r>
-              <a:rPr lang="en-US" altLang="ko-KR" sz="1200" b="0" dirty="0">
+              <a:t>Element</a:t>
+            </a:r>
+            <a:r>
+              <a:rPr lang="en-US" altLang="ko-KR" sz="1050" b="0" dirty="0">
                 <a:solidFill>
                   <a:srgbClr val="808080"/>
                 </a:solidFill>
@@ -5305,7 +5882,7 @@
               </a:rPr>
               <a:t>&gt;</a:t>
             </a:r>
-            <a:endParaRPr lang="en-US" altLang="ko-KR" sz="1200" b="0" dirty="0">
+            <a:endParaRPr lang="en-US" altLang="ko-KR" sz="1050" b="0" dirty="0">
               <a:solidFill>
                 <a:srgbClr val="CCCCCC"/>
               </a:solidFill>
@@ -5315,7 +5892,17 @@
           </a:p>
           <a:p>
             <a:r>
-              <a:rPr lang="en-US" altLang="ko-KR" sz="1200" b="0" dirty="0">
+              <a:rPr lang="en-US" altLang="ko-KR" sz="1050" b="0" dirty="0">
+                <a:solidFill>
+                  <a:srgbClr val="CCCCCC"/>
+                </a:solidFill>
+                <a:effectLst/>
+                <a:latin typeface="Consolas" panose="020B0609020204030204" pitchFamily="49" charset="0"/>
+              </a:rPr>
+              <a:t>    </a:t>
+            </a:r>
+            <a:r>
+              <a:rPr lang="en-US" altLang="ko-KR" sz="1050" b="0" dirty="0">
                 <a:solidFill>
                   <a:srgbClr val="808080"/>
                 </a:solidFill>
@@ -5325,17 +5912,17 @@
               <a:t>&lt;/</a:t>
             </a:r>
             <a:r>
-              <a:rPr lang="en-US" altLang="ko-KR" sz="1200" b="0" dirty="0" err="1">
+              <a:rPr lang="en-US" altLang="ko-KR" sz="1050" b="0" dirty="0">
                 <a:solidFill>
                   <a:srgbClr val="569CD6"/>
                 </a:solidFill>
                 <a:effectLst/>
                 <a:latin typeface="Consolas" panose="020B0609020204030204" pitchFamily="49" charset="0"/>
               </a:rPr>
-              <a:t>LDRoutine</a:t>
-            </a:r>
-            <a:r>
-              <a:rPr lang="en-US" altLang="ko-KR" sz="1200" b="0" dirty="0">
+              <a:t>Rung</a:t>
+            </a:r>
+            <a:r>
+              <a:rPr lang="en-US" altLang="ko-KR" sz="1050" b="0" dirty="0">
                 <a:solidFill>
                   <a:srgbClr val="808080"/>
                 </a:solidFill>
@@ -5344,7 +5931,7 @@
               </a:rPr>
               <a:t>&gt;</a:t>
             </a:r>
-            <a:endParaRPr lang="en-US" altLang="ko-KR" sz="1200" b="0" dirty="0">
+            <a:endParaRPr lang="en-US" altLang="ko-KR" sz="1050" b="0" dirty="0">
               <a:solidFill>
                 <a:srgbClr val="CCCCCC"/>
               </a:solidFill>
@@ -5352,14 +5939,459 @@
               <a:latin typeface="Consolas" panose="020B0609020204030204" pitchFamily="49" charset="0"/>
             </a:endParaRPr>
           </a:p>
+          <a:p>
+            <a:endParaRPr lang="en-US" altLang="ko-KR" sz="1050" b="0" dirty="0">
+              <a:solidFill>
+                <a:srgbClr val="CCCCCC"/>
+              </a:solidFill>
+              <a:effectLst/>
+              <a:latin typeface="Consolas" panose="020B0609020204030204" pitchFamily="49" charset="0"/>
+            </a:endParaRPr>
+          </a:p>
+          <a:p>
+            <a:r>
+              <a:rPr lang="en-US" altLang="ko-KR" sz="1050" b="0" dirty="0">
+                <a:solidFill>
+                  <a:srgbClr val="CCCCCC"/>
+                </a:solidFill>
+                <a:effectLst/>
+                <a:latin typeface="Consolas" panose="020B0609020204030204" pitchFamily="49" charset="0"/>
+              </a:rPr>
+              <a:t>    </a:t>
+            </a:r>
+            <a:r>
+              <a:rPr lang="en-US" altLang="ko-KR" sz="1050" b="0" dirty="0">
+                <a:solidFill>
+                  <a:srgbClr val="808080"/>
+                </a:solidFill>
+                <a:effectLst/>
+                <a:latin typeface="Consolas" panose="020B0609020204030204" pitchFamily="49" charset="0"/>
+              </a:rPr>
+              <a:t>&lt;</a:t>
+            </a:r>
+            <a:r>
+              <a:rPr lang="en-US" altLang="ko-KR" sz="1050" b="0" dirty="0" err="1">
+                <a:solidFill>
+                  <a:srgbClr val="569CD6"/>
+                </a:solidFill>
+                <a:effectLst/>
+                <a:latin typeface="Consolas" panose="020B0609020204030204" pitchFamily="49" charset="0"/>
+              </a:rPr>
+              <a:t>OnlineUploadData</a:t>
+            </a:r>
+            <a:r>
+              <a:rPr lang="en-US" altLang="ko-KR" sz="1050" b="0" dirty="0">
+                <a:solidFill>
+                  <a:srgbClr val="CCCCCC"/>
+                </a:solidFill>
+                <a:effectLst/>
+                <a:latin typeface="Consolas" panose="020B0609020204030204" pitchFamily="49" charset="0"/>
+              </a:rPr>
+              <a:t> </a:t>
+            </a:r>
+            <a:r>
+              <a:rPr lang="en-US" altLang="ko-KR" sz="1050" b="0" dirty="0">
+                <a:solidFill>
+                  <a:srgbClr val="9CDCFE"/>
+                </a:solidFill>
+                <a:effectLst/>
+                <a:latin typeface="Consolas" panose="020B0609020204030204" pitchFamily="49" charset="0"/>
+              </a:rPr>
+              <a:t>Compressed</a:t>
+            </a:r>
+            <a:r>
+              <a:rPr lang="en-US" altLang="ko-KR" sz="1050" b="0" dirty="0">
+                <a:solidFill>
+                  <a:srgbClr val="CCCCCC"/>
+                </a:solidFill>
+                <a:effectLst/>
+                <a:latin typeface="Consolas" panose="020B0609020204030204" pitchFamily="49" charset="0"/>
+              </a:rPr>
+              <a:t>=</a:t>
+            </a:r>
+            <a:r>
+              <a:rPr lang="en-US" altLang="ko-KR" sz="1050" b="0" dirty="0">
+                <a:solidFill>
+                  <a:srgbClr val="CE9178"/>
+                </a:solidFill>
+                <a:effectLst/>
+                <a:latin typeface="Consolas" panose="020B0609020204030204" pitchFamily="49" charset="0"/>
+              </a:rPr>
+              <a:t>"1"</a:t>
+            </a:r>
+            <a:r>
+              <a:rPr lang="en-US" altLang="ko-KR" sz="1050" b="0" dirty="0">
+                <a:solidFill>
+                  <a:srgbClr val="CCCCCC"/>
+                </a:solidFill>
+                <a:effectLst/>
+                <a:latin typeface="Consolas" panose="020B0609020204030204" pitchFamily="49" charset="0"/>
+              </a:rPr>
+              <a:t> </a:t>
+            </a:r>
+            <a:r>
+              <a:rPr lang="en-US" altLang="ko-KR" sz="1050" b="0" dirty="0" err="1">
+                <a:solidFill>
+                  <a:srgbClr val="9CDCFE"/>
+                </a:solidFill>
+                <a:effectLst/>
+                <a:latin typeface="Consolas" panose="020B0609020204030204" pitchFamily="49" charset="0"/>
+              </a:rPr>
+              <a:t>dt:dt</a:t>
+            </a:r>
+            <a:r>
+              <a:rPr lang="en-US" altLang="ko-KR" sz="1050" b="0" dirty="0">
+                <a:solidFill>
+                  <a:srgbClr val="CCCCCC"/>
+                </a:solidFill>
+                <a:effectLst/>
+                <a:latin typeface="Consolas" panose="020B0609020204030204" pitchFamily="49" charset="0"/>
+              </a:rPr>
+              <a:t>=</a:t>
+            </a:r>
+            <a:r>
+              <a:rPr lang="en-US" altLang="ko-KR" sz="1050" b="0" dirty="0">
+                <a:solidFill>
+                  <a:srgbClr val="CE9178"/>
+                </a:solidFill>
+                <a:effectLst/>
+                <a:latin typeface="Consolas" panose="020B0609020204030204" pitchFamily="49" charset="0"/>
+              </a:rPr>
+              <a:t>"bin.base64"</a:t>
+            </a:r>
+            <a:endParaRPr lang="en-US" altLang="ko-KR" sz="1050" b="0" dirty="0">
+              <a:solidFill>
+                <a:srgbClr val="CCCCCC"/>
+              </a:solidFill>
+              <a:effectLst/>
+              <a:latin typeface="Consolas" panose="020B0609020204030204" pitchFamily="49" charset="0"/>
+            </a:endParaRPr>
+          </a:p>
+          <a:p>
+            <a:r>
+              <a:rPr lang="en-US" altLang="ko-KR" sz="1050" b="0" dirty="0">
+                <a:solidFill>
+                  <a:srgbClr val="CCCCCC"/>
+                </a:solidFill>
+                <a:effectLst/>
+                <a:latin typeface="Consolas" panose="020B0609020204030204" pitchFamily="49" charset="0"/>
+              </a:rPr>
+              <a:t>        </a:t>
+            </a:r>
+            <a:r>
+              <a:rPr lang="en-US" altLang="ko-KR" sz="1050" b="0" dirty="0" err="1">
+                <a:solidFill>
+                  <a:srgbClr val="9CDCFE"/>
+                </a:solidFill>
+                <a:effectLst/>
+                <a:latin typeface="Consolas" panose="020B0609020204030204" pitchFamily="49" charset="0"/>
+              </a:rPr>
+              <a:t>xmlns:dt</a:t>
+            </a:r>
+            <a:r>
+              <a:rPr lang="en-US" altLang="ko-KR" sz="1050" b="0" dirty="0">
+                <a:solidFill>
+                  <a:srgbClr val="CCCCCC"/>
+                </a:solidFill>
+                <a:effectLst/>
+                <a:latin typeface="Consolas" panose="020B0609020204030204" pitchFamily="49" charset="0"/>
+              </a:rPr>
+              <a:t>=</a:t>
+            </a:r>
+            <a:r>
+              <a:rPr lang="en-US" altLang="ko-KR" sz="1050" b="0" dirty="0">
+                <a:solidFill>
+                  <a:srgbClr val="CE9178"/>
+                </a:solidFill>
+                <a:effectLst/>
+                <a:latin typeface="Consolas" panose="020B0609020204030204" pitchFamily="49" charset="0"/>
+              </a:rPr>
+              <a:t>"</a:t>
+            </a:r>
+            <a:r>
+              <a:rPr lang="en-US" altLang="ko-KR" sz="1050" b="0" dirty="0" err="1">
+                <a:solidFill>
+                  <a:srgbClr val="CE9178"/>
+                </a:solidFill>
+                <a:effectLst/>
+                <a:latin typeface="Consolas" panose="020B0609020204030204" pitchFamily="49" charset="0"/>
+              </a:rPr>
+              <a:t>urn:schemas-microsoft-com:datatypes</a:t>
+            </a:r>
+            <a:r>
+              <a:rPr lang="en-US" altLang="ko-KR" sz="1050" b="0" dirty="0">
+                <a:solidFill>
+                  <a:srgbClr val="CE9178"/>
+                </a:solidFill>
+                <a:effectLst/>
+                <a:latin typeface="Consolas" panose="020B0609020204030204" pitchFamily="49" charset="0"/>
+              </a:rPr>
+              <a:t>"</a:t>
+            </a:r>
+            <a:r>
+              <a:rPr lang="en-US" altLang="ko-KR" sz="1050" b="0" dirty="0">
+                <a:solidFill>
+                  <a:srgbClr val="808080"/>
+                </a:solidFill>
+                <a:effectLst/>
+                <a:latin typeface="Consolas" panose="020B0609020204030204" pitchFamily="49" charset="0"/>
+              </a:rPr>
+              <a:t>&gt;</a:t>
+            </a:r>
+            <a:endParaRPr lang="en-US" altLang="ko-KR" sz="1050" b="0" dirty="0">
+              <a:solidFill>
+                <a:srgbClr val="CCCCCC"/>
+              </a:solidFill>
+              <a:effectLst/>
+              <a:latin typeface="Consolas" panose="020B0609020204030204" pitchFamily="49" charset="0"/>
+            </a:endParaRPr>
+          </a:p>
+          <a:p>
+            <a:r>
+              <a:rPr lang="en-US" altLang="ko-KR" sz="1050" b="0" dirty="0" err="1">
+                <a:solidFill>
+                  <a:srgbClr val="CCCCCC"/>
+                </a:solidFill>
+                <a:effectLst/>
+                <a:latin typeface="Consolas" panose="020B0609020204030204" pitchFamily="49" charset="0"/>
+              </a:rPr>
+              <a:t>QlpoORdyRThQkAAAAAA</a:t>
+            </a:r>
+            <a:r>
+              <a:rPr lang="en-US" altLang="ko-KR" sz="1050" b="0" dirty="0">
+                <a:solidFill>
+                  <a:srgbClr val="CCCCCC"/>
+                </a:solidFill>
+                <a:effectLst/>
+                <a:latin typeface="Consolas" panose="020B0609020204030204" pitchFamily="49" charset="0"/>
+              </a:rPr>
+              <a:t>=</a:t>
+            </a:r>
+            <a:r>
+              <a:rPr lang="en-US" altLang="ko-KR" sz="1050" b="0" dirty="0">
+                <a:solidFill>
+                  <a:srgbClr val="808080"/>
+                </a:solidFill>
+                <a:effectLst/>
+                <a:latin typeface="Consolas" panose="020B0609020204030204" pitchFamily="49" charset="0"/>
+              </a:rPr>
+              <a:t>&lt;/</a:t>
+            </a:r>
+            <a:r>
+              <a:rPr lang="en-US" altLang="ko-KR" sz="1050" b="0" dirty="0" err="1">
+                <a:solidFill>
+                  <a:srgbClr val="569CD6"/>
+                </a:solidFill>
+                <a:effectLst/>
+                <a:latin typeface="Consolas" panose="020B0609020204030204" pitchFamily="49" charset="0"/>
+              </a:rPr>
+              <a:t>OnlineUploadData</a:t>
+            </a:r>
+            <a:r>
+              <a:rPr lang="en-US" altLang="ko-KR" sz="1050" b="0" dirty="0">
+                <a:solidFill>
+                  <a:srgbClr val="808080"/>
+                </a:solidFill>
+                <a:effectLst/>
+                <a:latin typeface="Consolas" panose="020B0609020204030204" pitchFamily="49" charset="0"/>
+              </a:rPr>
+              <a:t>&gt;</a:t>
+            </a:r>
+            <a:endParaRPr lang="en-US" altLang="ko-KR" sz="1050" b="0" dirty="0">
+              <a:solidFill>
+                <a:srgbClr val="CCCCCC"/>
+              </a:solidFill>
+              <a:effectLst/>
+              <a:latin typeface="Consolas" panose="020B0609020204030204" pitchFamily="49" charset="0"/>
+            </a:endParaRPr>
+          </a:p>
+          <a:p>
+            <a:r>
+              <a:rPr lang="en-US" altLang="ko-KR" sz="1050" b="0" dirty="0">
+                <a:solidFill>
+                  <a:srgbClr val="808080"/>
+                </a:solidFill>
+                <a:effectLst/>
+                <a:latin typeface="Consolas" panose="020B0609020204030204" pitchFamily="49" charset="0"/>
+              </a:rPr>
+              <a:t>&lt;/</a:t>
+            </a:r>
+            <a:r>
+              <a:rPr lang="en-US" altLang="ko-KR" sz="1050" b="0" dirty="0" err="1">
+                <a:solidFill>
+                  <a:srgbClr val="569CD6"/>
+                </a:solidFill>
+                <a:effectLst/>
+                <a:latin typeface="Consolas" panose="020B0609020204030204" pitchFamily="49" charset="0"/>
+              </a:rPr>
+              <a:t>LDRoutine</a:t>
+            </a:r>
+            <a:r>
+              <a:rPr lang="en-US" altLang="ko-KR" sz="1050" b="0" dirty="0">
+                <a:solidFill>
+                  <a:srgbClr val="808080"/>
+                </a:solidFill>
+                <a:effectLst/>
+                <a:latin typeface="Consolas" panose="020B0609020204030204" pitchFamily="49" charset="0"/>
+              </a:rPr>
+              <a:t>&gt;</a:t>
+            </a:r>
+            <a:endParaRPr lang="en-US" altLang="ko-KR" sz="1050" b="0" dirty="0">
+              <a:solidFill>
+                <a:srgbClr val="CCCCCC"/>
+              </a:solidFill>
+              <a:effectLst/>
+              <a:latin typeface="Consolas" panose="020B0609020204030204" pitchFamily="49" charset="0"/>
+            </a:endParaRPr>
+          </a:p>
+        </p:txBody>
+      </p:sp>
+      <p:sp>
+        <p:nvSpPr>
+          <p:cNvPr id="8" name="TextBox 7">
+            <a:extLst>
+              <a:ext uri="{FF2B5EF4-FFF2-40B4-BE49-F238E27FC236}">
+                <a16:creationId xmlns:a16="http://schemas.microsoft.com/office/drawing/2014/main" id="{9BE303E4-218A-CFD4-CE05-4C199BD2BEC4}"/>
+              </a:ext>
+            </a:extLst>
+          </p:cNvPr>
+          <p:cNvSpPr txBox="1"/>
+          <p:nvPr/>
+        </p:nvSpPr>
+        <p:spPr>
+          <a:xfrm>
+            <a:off x="9464794" y="3682792"/>
+            <a:ext cx="2669424" cy="1815882"/>
+          </a:xfrm>
+          <a:prstGeom prst="rect">
+            <a:avLst/>
+          </a:prstGeom>
+          <a:noFill/>
+        </p:spPr>
+        <p:txBody>
+          <a:bodyPr wrap="square">
+            <a:spAutoFit/>
+          </a:bodyPr>
+          <a:lstStyle/>
+          <a:p>
+            <a:r>
+              <a:rPr lang="en-US" altLang="ko-KR" sz="1400" b="0" dirty="0">
+                <a:effectLst/>
+                <a:latin typeface="Consolas" panose="020B0609020204030204" pitchFamily="49" charset="0"/>
+              </a:rPr>
+              <a:t>M00000 : START</a:t>
+            </a:r>
+          </a:p>
+          <a:p>
+            <a:r>
+              <a:rPr lang="en-US" altLang="ko-KR" sz="1400" b="0" dirty="0">
+                <a:effectLst/>
+                <a:latin typeface="Consolas" panose="020B0609020204030204" pitchFamily="49" charset="0"/>
+              </a:rPr>
+              <a:t>M00001 : DONE</a:t>
+            </a:r>
+          </a:p>
+          <a:p>
+            <a:endParaRPr lang="en-US" altLang="ko-KR" sz="1400" b="0" dirty="0">
+              <a:effectLst/>
+              <a:latin typeface="Consolas" panose="020B0609020204030204" pitchFamily="49" charset="0"/>
+            </a:endParaRPr>
+          </a:p>
+          <a:p>
+            <a:r>
+              <a:rPr lang="en-US" altLang="ko-KR" sz="1400" b="0" dirty="0" err="1">
+                <a:effectLst/>
+                <a:latin typeface="Consolas" panose="020B0609020204030204" pitchFamily="49" charset="0"/>
+              </a:rPr>
+              <a:t>ElementType</a:t>
+            </a:r>
+            <a:endParaRPr lang="en-US" altLang="ko-KR" sz="1400" b="0" dirty="0">
+              <a:effectLst/>
+              <a:latin typeface="Consolas" panose="020B0609020204030204" pitchFamily="49" charset="0"/>
+            </a:endParaRPr>
+          </a:p>
+          <a:p>
+            <a:r>
+              <a:rPr lang="en-US" altLang="ko-KR" sz="1400" dirty="0">
+                <a:latin typeface="Consolas" panose="020B0609020204030204" pitchFamily="49" charset="0"/>
+              </a:rPr>
+              <a:t>  </a:t>
+            </a:r>
+            <a:r>
+              <a:rPr lang="en-US" altLang="ko-KR" sz="1400" dirty="0" err="1">
+                <a:latin typeface="Consolas" panose="020B0609020204030204" pitchFamily="49" charset="0"/>
+              </a:rPr>
+              <a:t>PulseContactMode</a:t>
+            </a:r>
+            <a:r>
+              <a:rPr lang="en-US" altLang="ko-KR" sz="1400" dirty="0">
+                <a:latin typeface="Consolas" panose="020B0609020204030204" pitchFamily="49" charset="0"/>
+              </a:rPr>
+              <a:t> = 8</a:t>
+            </a:r>
+            <a:endParaRPr lang="en-US" altLang="ko-KR" sz="1400" b="0" dirty="0">
+              <a:effectLst/>
+              <a:latin typeface="Consolas" panose="020B0609020204030204" pitchFamily="49" charset="0"/>
+            </a:endParaRPr>
+          </a:p>
+          <a:p>
+            <a:r>
+              <a:rPr lang="en-US" altLang="ko-KR" sz="1400" b="0" dirty="0">
+                <a:effectLst/>
+                <a:latin typeface="Consolas" panose="020B0609020204030204" pitchFamily="49" charset="0"/>
+              </a:rPr>
+              <a:t>  </a:t>
+            </a:r>
+            <a:r>
+              <a:rPr lang="en-US" altLang="ko-KR" sz="1400" b="0" dirty="0" err="1">
+                <a:effectLst/>
+                <a:latin typeface="Consolas" panose="020B0609020204030204" pitchFamily="49" charset="0"/>
+              </a:rPr>
+              <a:t>ResetCoilMode</a:t>
+            </a:r>
+            <a:r>
+              <a:rPr lang="en-US" altLang="ko-KR" sz="1400" b="0" dirty="0">
+                <a:effectLst/>
+                <a:latin typeface="Consolas" panose="020B0609020204030204" pitchFamily="49" charset="0"/>
+              </a:rPr>
+              <a:t> = 17</a:t>
+            </a:r>
+          </a:p>
+          <a:p>
+            <a:r>
+              <a:rPr lang="en-US" altLang="ko-KR" sz="1400" b="0" dirty="0">
+                <a:effectLst/>
+                <a:latin typeface="Consolas" panose="020B0609020204030204" pitchFamily="49" charset="0"/>
+              </a:rPr>
+              <a:t>  </a:t>
+            </a:r>
+            <a:r>
+              <a:rPr lang="en-US" altLang="ko-KR" sz="1400" b="0" dirty="0" err="1">
+                <a:effectLst/>
+                <a:latin typeface="Consolas" panose="020B0609020204030204" pitchFamily="49" charset="0"/>
+              </a:rPr>
+              <a:t>FBMode</a:t>
+            </a:r>
+            <a:r>
+              <a:rPr lang="en-US" altLang="ko-KR" sz="1400" b="0" dirty="0">
+                <a:effectLst/>
+                <a:latin typeface="Consolas" panose="020B0609020204030204" pitchFamily="49" charset="0"/>
+              </a:rPr>
+              <a:t> = 33</a:t>
+            </a:r>
+            <a:endParaRPr lang="ko-KR" altLang="en-US" sz="1400" dirty="0"/>
+          </a:p>
+          <a:p>
+            <a:endParaRPr lang="ko-KR" altLang="en-US" sz="1400" dirty="0"/>
+          </a:p>
         </p:txBody>
       </p:sp>
       <p:pic>
         <p:nvPicPr>
-          <p:cNvPr id="6" name="그림 5">
+          <p:cNvPr id="4" name="그림 3">
             <a:extLst>
               <a:ext uri="{FF2B5EF4-FFF2-40B4-BE49-F238E27FC236}">
-                <a16:creationId xmlns:a16="http://schemas.microsoft.com/office/drawing/2014/main" id="{57E5C21E-5590-EEED-3A3F-C1E838523C48}"/>
+                <a16:creationId xmlns:a16="http://schemas.microsoft.com/office/drawing/2014/main" id="{BC17F0E4-A7E4-FD67-B76A-7A883493FBC6}"/>
               </a:ext>
             </a:extLst>
           </p:cNvPr>
@@ -5376,84 +6408,14 @@
         </p:blipFill>
         <p:spPr>
           <a:xfrm>
-            <a:off x="762542" y="1506349"/>
-            <a:ext cx="9677400" cy="1314450"/>
+            <a:off x="887292" y="1285694"/>
+            <a:ext cx="8943975" cy="2076450"/>
           </a:xfrm>
           <a:prstGeom prst="rect">
             <a:avLst/>
           </a:prstGeom>
         </p:spPr>
       </p:pic>
-      <p:sp>
-        <p:nvSpPr>
-          <p:cNvPr id="8" name="TextBox 7">
-            <a:extLst>
-              <a:ext uri="{FF2B5EF4-FFF2-40B4-BE49-F238E27FC236}">
-                <a16:creationId xmlns:a16="http://schemas.microsoft.com/office/drawing/2014/main" id="{9BE303E4-218A-CFD4-CE05-4C199BD2BEC4}"/>
-              </a:ext>
-            </a:extLst>
-          </p:cNvPr>
-          <p:cNvSpPr txBox="1"/>
-          <p:nvPr/>
-        </p:nvSpPr>
-        <p:spPr>
-          <a:xfrm>
-            <a:off x="7883012" y="3756464"/>
-            <a:ext cx="3470788" cy="954107"/>
-          </a:xfrm>
-          <a:prstGeom prst="rect">
-            <a:avLst/>
-          </a:prstGeom>
-          <a:noFill/>
-        </p:spPr>
-        <p:txBody>
-          <a:bodyPr wrap="square">
-            <a:spAutoFit/>
-          </a:bodyPr>
-          <a:lstStyle/>
-          <a:p>
-            <a:r>
-              <a:rPr lang="en-US" altLang="ko-KR" sz="1400" b="0" dirty="0">
-                <a:effectLst/>
-                <a:latin typeface="Consolas" panose="020B0609020204030204" pitchFamily="49" charset="0"/>
-              </a:rPr>
-              <a:t>M00000 : START</a:t>
-            </a:r>
-          </a:p>
-          <a:p>
-            <a:r>
-              <a:rPr lang="en-US" altLang="ko-KR" sz="1400" b="0" dirty="0">
-                <a:effectLst/>
-                <a:latin typeface="Consolas" panose="020B0609020204030204" pitchFamily="49" charset="0"/>
-              </a:rPr>
-              <a:t>M00001 : DONE</a:t>
-            </a:r>
-          </a:p>
-          <a:p>
-            <a:endParaRPr lang="en-US" altLang="ko-KR" sz="1400" b="0" dirty="0">
-              <a:effectLst/>
-              <a:latin typeface="Consolas" panose="020B0609020204030204" pitchFamily="49" charset="0"/>
-            </a:endParaRPr>
-          </a:p>
-          <a:p>
-            <a:r>
-              <a:rPr lang="en-US" altLang="ko-KR" sz="1400" b="0" dirty="0" err="1">
-                <a:effectLst/>
-                <a:latin typeface="Consolas" panose="020B0609020204030204" pitchFamily="49" charset="0"/>
-              </a:rPr>
-              <a:t>ElementType.FBMode</a:t>
-            </a:r>
-            <a:r>
-              <a:rPr lang="en-US" altLang="ko-KR" sz="1400" b="0" dirty="0">
-                <a:effectLst/>
-                <a:latin typeface="Consolas" panose="020B0609020204030204" pitchFamily="49" charset="0"/>
-              </a:rPr>
-              <a:t> == 33</a:t>
-            </a:r>
-            <a:endParaRPr lang="ko-KR" altLang="en-US" sz="1400" dirty="0"/>
-          </a:p>
-        </p:txBody>
-      </p:sp>
     </p:spTree>
     <p:extLst>
       <p:ext uri="{BB962C8B-B14F-4D97-AF65-F5344CB8AC3E}">

</xml_diff>